<commit_message>
Updated Psychonomics 24 poster
</commit_message>
<xml_diff>
--- a/posters/23.11.2024 Psychonomics.pptx
+++ b/posters/23.11.2024 Psychonomics.pptx
@@ -197,7 +197,7 @@
           <a:p>
             <a:fld id="{EEC5D35E-0963-4D6F-988F-33756D057105}" type="datetimeFigureOut">
               <a:rPr lang="en-GB" smtClean="0"/>
-              <a:t>11/11/2024</a:t>
+              <a:t>13/11/2024</a:t>
             </a:fld>
             <a:endParaRPr lang="en-GB"/>
           </a:p>
@@ -705,7 +705,7 @@
           <a:p>
             <a:fld id="{CC43DE9C-2BD6-4679-B7E2-0596B4CBC97F}" type="datetimeFigureOut">
               <a:rPr lang="en-GB" smtClean="0"/>
-              <a:t>11/11/2024</a:t>
+              <a:t>13/11/2024</a:t>
             </a:fld>
             <a:endParaRPr lang="en-GB"/>
           </a:p>
@@ -875,7 +875,7 @@
           <a:p>
             <a:fld id="{CC43DE9C-2BD6-4679-B7E2-0596B4CBC97F}" type="datetimeFigureOut">
               <a:rPr lang="en-GB" smtClean="0"/>
-              <a:t>11/11/2024</a:t>
+              <a:t>13/11/2024</a:t>
             </a:fld>
             <a:endParaRPr lang="en-GB"/>
           </a:p>
@@ -1055,7 +1055,7 @@
           <a:p>
             <a:fld id="{CC43DE9C-2BD6-4679-B7E2-0596B4CBC97F}" type="datetimeFigureOut">
               <a:rPr lang="en-GB" smtClean="0"/>
-              <a:t>11/11/2024</a:t>
+              <a:t>13/11/2024</a:t>
             </a:fld>
             <a:endParaRPr lang="en-GB"/>
           </a:p>
@@ -1225,7 +1225,7 @@
           <a:p>
             <a:fld id="{CC43DE9C-2BD6-4679-B7E2-0596B4CBC97F}" type="datetimeFigureOut">
               <a:rPr lang="en-GB" smtClean="0"/>
-              <a:t>11/11/2024</a:t>
+              <a:t>13/11/2024</a:t>
             </a:fld>
             <a:endParaRPr lang="en-GB"/>
           </a:p>
@@ -1469,7 +1469,7 @@
           <a:p>
             <a:fld id="{CC43DE9C-2BD6-4679-B7E2-0596B4CBC97F}" type="datetimeFigureOut">
               <a:rPr lang="en-GB" smtClean="0"/>
-              <a:t>11/11/2024</a:t>
+              <a:t>13/11/2024</a:t>
             </a:fld>
             <a:endParaRPr lang="en-GB"/>
           </a:p>
@@ -1701,7 +1701,7 @@
           <a:p>
             <a:fld id="{CC43DE9C-2BD6-4679-B7E2-0596B4CBC97F}" type="datetimeFigureOut">
               <a:rPr lang="en-GB" smtClean="0"/>
-              <a:t>11/11/2024</a:t>
+              <a:t>13/11/2024</a:t>
             </a:fld>
             <a:endParaRPr lang="en-GB"/>
           </a:p>
@@ -2068,7 +2068,7 @@
           <a:p>
             <a:fld id="{CC43DE9C-2BD6-4679-B7E2-0596B4CBC97F}" type="datetimeFigureOut">
               <a:rPr lang="en-GB" smtClean="0"/>
-              <a:t>11/11/2024</a:t>
+              <a:t>13/11/2024</a:t>
             </a:fld>
             <a:endParaRPr lang="en-GB"/>
           </a:p>
@@ -2186,7 +2186,7 @@
           <a:p>
             <a:fld id="{CC43DE9C-2BD6-4679-B7E2-0596B4CBC97F}" type="datetimeFigureOut">
               <a:rPr lang="en-GB" smtClean="0"/>
-              <a:t>11/11/2024</a:t>
+              <a:t>13/11/2024</a:t>
             </a:fld>
             <a:endParaRPr lang="en-GB"/>
           </a:p>
@@ -2281,7 +2281,7 @@
           <a:p>
             <a:fld id="{CC43DE9C-2BD6-4679-B7E2-0596B4CBC97F}" type="datetimeFigureOut">
               <a:rPr lang="en-GB" smtClean="0"/>
-              <a:t>11/11/2024</a:t>
+              <a:t>13/11/2024</a:t>
             </a:fld>
             <a:endParaRPr lang="en-GB"/>
           </a:p>
@@ -2558,7 +2558,7 @@
           <a:p>
             <a:fld id="{CC43DE9C-2BD6-4679-B7E2-0596B4CBC97F}" type="datetimeFigureOut">
               <a:rPr lang="en-GB" smtClean="0"/>
-              <a:t>11/11/2024</a:t>
+              <a:t>13/11/2024</a:t>
             </a:fld>
             <a:endParaRPr lang="en-GB"/>
           </a:p>
@@ -2815,7 +2815,7 @@
           <a:p>
             <a:fld id="{CC43DE9C-2BD6-4679-B7E2-0596B4CBC97F}" type="datetimeFigureOut">
               <a:rPr lang="en-GB" smtClean="0"/>
-              <a:t>11/11/2024</a:t>
+              <a:t>13/11/2024</a:t>
             </a:fld>
             <a:endParaRPr lang="en-GB"/>
           </a:p>
@@ -3028,7 +3028,7 @@
           <a:p>
             <a:fld id="{CC43DE9C-2BD6-4679-B7E2-0596B4CBC97F}" type="datetimeFigureOut">
               <a:rPr lang="en-GB" smtClean="0"/>
-              <a:t>11/11/2024</a:t>
+              <a:t>13/11/2024</a:t>
             </a:fld>
             <a:endParaRPr lang="en-GB"/>
           </a:p>
@@ -4001,8 +4001,8 @@
         </p:nvSpPr>
         <p:spPr>
           <a:xfrm>
-            <a:off x="2460898" y="32787018"/>
-            <a:ext cx="42451256" cy="720000"/>
+            <a:off x="22344605" y="30731791"/>
+            <a:ext cx="20826539" cy="1501228"/>
           </a:xfrm>
           <a:prstGeom prst="rect">
             <a:avLst/>
@@ -4277,7 +4277,7 @@
               <a:rPr lang="en-GB" sz="7000" dirty="0">
                 <a:latin typeface="Source Sans Pro Black" panose="020B0803030403020204" pitchFamily="34" charset="0"/>
               </a:rPr>
-              <a:t>Results</a:t>
+              <a:t>Preliminary Results</a:t>
             </a:r>
           </a:p>
         </p:txBody>
@@ -4442,12 +4442,12 @@
                 </a:solidFill>
                 <a:latin typeface="Source Sans Pro" panose="020B0503030403020204" pitchFamily="34" charset="0"/>
               </a:rPr>
-              <a:t>Unbeknownst to participants. one </a:t>
+              <a:t>Unbeknownst to participants, one </a:t>
             </a:r>
             <a:r>
               <a:rPr lang="en-GB" sz="5000" b="1" dirty="0">
                 <a:solidFill>
-                  <a:srgbClr val="131E29"/>
+                  <a:srgbClr val="440099"/>
                 </a:solidFill>
                 <a:latin typeface="Source Sans Pro" panose="020B0503030403020204" pitchFamily="34" charset="0"/>
               </a:rPr>
@@ -4465,7 +4465,7 @@
             <a:r>
               <a:rPr lang="en-GB" sz="5000" b="1" dirty="0">
                 <a:solidFill>
-                  <a:srgbClr val="131E29"/>
+                  <a:srgbClr val="981F92"/>
                 </a:solidFill>
                 <a:latin typeface="Source Sans Pro" panose="020B0503030403020204" pitchFamily="34" charset="0"/>
               </a:rPr>
@@ -6011,8 +6011,8 @@
         </p:nvSpPr>
         <p:spPr>
           <a:xfrm>
-            <a:off x="22344605" y="4737818"/>
-            <a:ext cx="11344403" cy="8667159"/>
+            <a:off x="22344605" y="4725485"/>
+            <a:ext cx="11425986" cy="10569221"/>
           </a:xfrm>
           <a:prstGeom prst="rect">
             <a:avLst/>
@@ -6053,17 +6053,60 @@
                 </a:solidFill>
                 <a:latin typeface="Source Sans Pro" panose="020B0503030403020204" pitchFamily="34" charset="0"/>
               </a:rPr>
-              <a:t>Overall, participants showed greater accuracy on Hebb compared to Filler trials </a:t>
+              <a:t>Overall, </a:t>
             </a:r>
             <a:r>
               <a:rPr lang="en-GB" sz="5000" b="1" dirty="0">
                 <a:solidFill>
-                  <a:srgbClr val="FF0000"/>
-                </a:solidFill>
-                <a:latin typeface="Source Sans Pro" panose="020B0503030403020204" pitchFamily="34" charset="0"/>
-              </a:rPr>
-              <a:t>(p = 0.00, BF = 0.00)</a:t>
-            </a:r>
+                  <a:srgbClr val="131E29"/>
+                </a:solidFill>
+                <a:latin typeface="Source Sans Pro" panose="020B0503030403020204" pitchFamily="34" charset="0"/>
+              </a:rPr>
+              <a:t>greater mean accuracy </a:t>
+            </a:r>
+            <a:r>
+              <a:rPr lang="en-GB" sz="5000" dirty="0">
+                <a:solidFill>
+                  <a:srgbClr val="131E29"/>
+                </a:solidFill>
+                <a:latin typeface="Source Sans Pro" panose="020B0503030403020204" pitchFamily="34" charset="0"/>
+              </a:rPr>
+              <a:t>on </a:t>
+            </a:r>
+            <a:r>
+              <a:rPr lang="en-GB" sz="5000" b="1" dirty="0">
+                <a:solidFill>
+                  <a:srgbClr val="131E29"/>
+                </a:solidFill>
+                <a:latin typeface="Source Sans Pro" panose="020B0503030403020204" pitchFamily="34" charset="0"/>
+              </a:rPr>
+              <a:t>Hebb</a:t>
+            </a:r>
+            <a:r>
+              <a:rPr lang="en-GB" sz="5000" dirty="0">
+                <a:solidFill>
+                  <a:srgbClr val="131E29"/>
+                </a:solidFill>
+                <a:latin typeface="Source Sans Pro" panose="020B0503030403020204" pitchFamily="34" charset="0"/>
+              </a:rPr>
+              <a:t> than Filler trials. </a:t>
+            </a:r>
+          </a:p>
+          <a:p>
+            <a:endParaRPr lang="en-GB" sz="5000" dirty="0">
+              <a:solidFill>
+                <a:srgbClr val="131E29"/>
+              </a:solidFill>
+              <a:latin typeface="Source Sans Pro" panose="020B0503030403020204" pitchFamily="34" charset="0"/>
+            </a:endParaRPr>
+          </a:p>
+          <a:p>
+            <a:endParaRPr lang="en-GB" sz="5000" dirty="0">
+              <a:solidFill>
+                <a:srgbClr val="131E29"/>
+              </a:solidFill>
+              <a:latin typeface="Source Sans Pro" panose="020B0503030403020204" pitchFamily="34" charset="0"/>
+            </a:endParaRPr>
           </a:p>
           <a:p>
             <a:pPr marL="685800" indent="-685800">
@@ -6077,26 +6120,41 @@
                 </a:solidFill>
                 <a:latin typeface="Source Sans Pro" panose="020B0503030403020204" pitchFamily="34" charset="0"/>
               </a:rPr>
-              <a:t>Participants also showed an improvement in accuracy from Block 1 to Block 2 of the Hebb trials </a:t>
-            </a:r>
-            <a:r>
-              <a:rPr lang="en-GB" sz="5000" b="1" dirty="0">
-                <a:solidFill>
-                  <a:srgbClr val="FF0000"/>
-                </a:solidFill>
-                <a:latin typeface="Source Sans Pro" panose="020B0503030403020204" pitchFamily="34" charset="0"/>
-              </a:rPr>
-              <a:t>(p = 0.00, BF = 0.00)</a:t>
-            </a:r>
-            <a:r>
-              <a:rPr lang="en-GB" sz="5000" dirty="0">
-                <a:solidFill>
-                  <a:schemeClr val="tx1"/>
-                </a:solidFill>
-                <a:latin typeface="Source Sans Pro" panose="020B0503030403020204" pitchFamily="34" charset="0"/>
-              </a:rPr>
-              <a:t>.</a:t>
-            </a:r>
+              <a:t>Allows estimation of both population-level parameters which describe the sample as a whole, and individual-level parameters per participant </a:t>
+            </a:r>
+            <a:r>
+              <a:rPr lang="en-GB" sz="4000" i="1" dirty="0">
+                <a:solidFill>
+                  <a:srgbClr val="131E29"/>
+                </a:solidFill>
+                <a:latin typeface="Source Sans Pro" panose="020B0503030403020204" pitchFamily="34" charset="0"/>
+              </a:rPr>
+              <a:t>(</a:t>
+            </a:r>
+            <a:r>
+              <a:rPr lang="en-GB" sz="4000" i="1" dirty="0" err="1">
+                <a:solidFill>
+                  <a:srgbClr val="131E29"/>
+                </a:solidFill>
+                <a:latin typeface="Source Sans Pro" panose="020B0503030403020204" pitchFamily="34" charset="0"/>
+              </a:rPr>
+              <a:t>Musfeld</a:t>
+            </a:r>
+            <a:r>
+              <a:rPr lang="en-GB" sz="4000" i="1" dirty="0">
+                <a:solidFill>
+                  <a:srgbClr val="131E29"/>
+                </a:solidFill>
+                <a:latin typeface="Source Sans Pro" panose="020B0503030403020204" pitchFamily="34" charset="0"/>
+              </a:rPr>
+              <a:t> et al., 2023).</a:t>
+            </a:r>
+            <a:endParaRPr lang="en-GB" sz="4000" dirty="0">
+              <a:solidFill>
+                <a:srgbClr val="131E29"/>
+              </a:solidFill>
+              <a:latin typeface="Source Sans Pro" panose="020B0503030403020204" pitchFamily="34" charset="0"/>
+            </a:endParaRPr>
           </a:p>
           <a:p>
             <a:pPr marL="685800" indent="-685800">
@@ -6104,13 +6162,103 @@
               <a:buChar char="•"/>
             </a:pPr>
             <a:r>
+              <a:rPr lang="en-GB" sz="5000" b="1" dirty="0">
+                <a:solidFill>
+                  <a:srgbClr val="F9918A"/>
+                </a:solidFill>
+                <a:latin typeface="Source Sans Pro" panose="020B0503030403020204" pitchFamily="34" charset="0"/>
+              </a:rPr>
+              <a:t>Mixture Proportion</a:t>
+            </a:r>
+            <a:r>
               <a:rPr lang="en-GB" sz="5000" dirty="0">
                 <a:solidFill>
-                  <a:schemeClr val="tx1"/>
-                </a:solidFill>
-                <a:latin typeface="Source Sans Pro" panose="020B0503030403020204" pitchFamily="34" charset="0"/>
-              </a:rPr>
-              <a:t>Mixture modelling was applied to learning data revealing.</a:t>
+                  <a:srgbClr val="F9918A"/>
+                </a:solidFill>
+                <a:latin typeface="Source Sans Pro" panose="020B0503030403020204" pitchFamily="34" charset="0"/>
+              </a:rPr>
+              <a:t>: </a:t>
+            </a:r>
+            <a:r>
+              <a:rPr lang="en-GB" sz="5000" dirty="0">
+                <a:solidFill>
+                  <a:srgbClr val="131E29"/>
+                </a:solidFill>
+                <a:latin typeface="Source Sans Pro" panose="020B0503030403020204" pitchFamily="34" charset="0"/>
+              </a:rPr>
+              <a:t>number of participants classified as </a:t>
+            </a:r>
+            <a:r>
+              <a:rPr lang="en-GB" sz="5000" b="1" dirty="0">
+                <a:solidFill>
+                  <a:srgbClr val="131E29"/>
+                </a:solidFill>
+                <a:latin typeface="Source Sans Pro" panose="020B0503030403020204" pitchFamily="34" charset="0"/>
+              </a:rPr>
+              <a:t>Learners</a:t>
+            </a:r>
+            <a:r>
+              <a:rPr lang="en-GB" sz="5000" dirty="0">
+                <a:solidFill>
+                  <a:srgbClr val="131E29"/>
+                </a:solidFill>
+                <a:latin typeface="Source Sans Pro" panose="020B0503030403020204" pitchFamily="34" charset="0"/>
+              </a:rPr>
+              <a:t> (</a:t>
+            </a:r>
+            <a:r>
+              <a:rPr lang="en-GB" sz="5000" i="1" dirty="0">
+                <a:solidFill>
+                  <a:srgbClr val="131E29"/>
+                </a:solidFill>
+                <a:latin typeface="Source Sans Pro" panose="020B0503030403020204" pitchFamily="34" charset="0"/>
+              </a:rPr>
+              <a:t>n</a:t>
+            </a:r>
+            <a:r>
+              <a:rPr lang="en-GB" sz="5000" dirty="0">
+                <a:solidFill>
+                  <a:srgbClr val="131E29"/>
+                </a:solidFill>
+                <a:latin typeface="Source Sans Pro" panose="020B0503030403020204" pitchFamily="34" charset="0"/>
+              </a:rPr>
+              <a:t> = 27) and </a:t>
+            </a:r>
+            <a:r>
+              <a:rPr lang="en-GB" sz="5000" b="1" dirty="0">
+                <a:solidFill>
+                  <a:srgbClr val="131E29"/>
+                </a:solidFill>
+                <a:latin typeface="Source Sans Pro" panose="020B0503030403020204" pitchFamily="34" charset="0"/>
+              </a:rPr>
+              <a:t>Non-Learners</a:t>
+            </a:r>
+            <a:r>
+              <a:rPr lang="en-GB" sz="5000" dirty="0">
+                <a:solidFill>
+                  <a:srgbClr val="131E29"/>
+                </a:solidFill>
+                <a:latin typeface="Source Sans Pro" panose="020B0503030403020204" pitchFamily="34" charset="0"/>
+              </a:rPr>
+              <a:t> (</a:t>
+            </a:r>
+            <a:r>
+              <a:rPr lang="en-GB" sz="5000" i="1" dirty="0">
+                <a:solidFill>
+                  <a:srgbClr val="131E29"/>
+                </a:solidFill>
+                <a:latin typeface="Source Sans Pro" panose="020B0503030403020204" pitchFamily="34" charset="0"/>
+              </a:rPr>
+              <a:t>n</a:t>
+            </a:r>
+            <a:r>
+              <a:rPr lang="en-GB" sz="5000" dirty="0">
+                <a:solidFill>
+                  <a:srgbClr val="131E29"/>
+                </a:solidFill>
+                <a:latin typeface="Source Sans Pro" panose="020B0503030403020204" pitchFamily="34" charset="0"/>
+              </a:rPr>
+              <a:t> = 29).</a:t>
             </a:r>
           </a:p>
           <a:p>
@@ -6119,23 +6267,68 @@
               <a:buChar char="•"/>
             </a:pPr>
             <a:r>
+              <a:rPr lang="en-GB" sz="5000" b="1" dirty="0">
+                <a:solidFill>
+                  <a:srgbClr val="131E29"/>
+                </a:solidFill>
+                <a:latin typeface="Source Sans Pro" panose="020B0503030403020204" pitchFamily="34" charset="0"/>
+              </a:rPr>
+              <a:t>Learning Curve: </a:t>
+            </a:r>
+            <a:r>
+              <a:rPr lang="en-GB" sz="5000" b="1" dirty="0">
+                <a:solidFill>
+                  <a:srgbClr val="33CCD0"/>
+                </a:solidFill>
+                <a:latin typeface="Source Sans Pro" panose="020B0503030403020204" pitchFamily="34" charset="0"/>
+              </a:rPr>
+              <a:t>Learning Rate</a:t>
+            </a:r>
+            <a:r>
               <a:rPr lang="en-GB" sz="5000" dirty="0">
                 <a:solidFill>
-                  <a:schemeClr val="tx1"/>
-                </a:solidFill>
-                <a:latin typeface="Source Sans Pro" panose="020B0503030403020204" pitchFamily="34" charset="0"/>
-              </a:rPr>
-              <a:t>Statistical tests revealed CS ranking related to XXX</a:t>
+                  <a:srgbClr val="131E29"/>
+                </a:solidFill>
+                <a:latin typeface="Source Sans Pro" panose="020B0503030403020204" pitchFamily="34" charset="0"/>
+              </a:rPr>
+              <a:t>, </a:t>
+            </a:r>
+            <a:r>
+              <a:rPr lang="en-GB" sz="5000" b="1" dirty="0">
+                <a:solidFill>
+                  <a:srgbClr val="81B0FF"/>
+                </a:solidFill>
+                <a:latin typeface="Source Sans Pro" panose="020B0503030403020204" pitchFamily="34" charset="0"/>
+              </a:rPr>
+              <a:t>Onset of Learning</a:t>
+            </a:r>
+            <a:r>
+              <a:rPr lang="en-GB" sz="5000" dirty="0">
+                <a:solidFill>
+                  <a:srgbClr val="131E29"/>
+                </a:solidFill>
+                <a:latin typeface="Source Sans Pro" panose="020B0503030403020204" pitchFamily="34" charset="0"/>
+              </a:rPr>
+              <a:t> and </a:t>
+            </a:r>
+            <a:r>
+              <a:rPr lang="en-GB" sz="5000" b="1" dirty="0">
+                <a:solidFill>
+                  <a:srgbClr val="F783E9"/>
+                </a:solidFill>
+                <a:latin typeface="Source Sans Pro" panose="020B0503030403020204" pitchFamily="34" charset="0"/>
+              </a:rPr>
+              <a:t>Upper Asymptote</a:t>
             </a:r>
           </a:p>
         </p:txBody>
       </p:sp>
       <p:grpSp>
         <p:nvGrpSpPr>
-          <p:cNvPr id="31" name="Group 30">
+          <p:cNvPr id="52" name="Group 51">
             <a:extLst>
               <a:ext uri="{FF2B5EF4-FFF2-40B4-BE49-F238E27FC236}">
-                <a16:creationId xmlns:a16="http://schemas.microsoft.com/office/drawing/2014/main" id="{F8840AF8-0E82-CB02-BB43-2C3F257F9010}"/>
+                <a16:creationId xmlns:a16="http://schemas.microsoft.com/office/drawing/2014/main" id="{1B4F7BE6-C3C8-FC75-9B11-876FA37D8A1D}"/>
               </a:ext>
             </a:extLst>
           </p:cNvPr>
@@ -6144,18 +6337,756 @@
         </p:nvGrpSpPr>
         <p:grpSpPr>
           <a:xfrm>
-            <a:off x="33729556" y="5032334"/>
-            <a:ext cx="8991438" cy="8377993"/>
-            <a:chOff x="34517936" y="4677738"/>
-            <a:chExt cx="8649202" cy="8243997"/>
+            <a:off x="44319811" y="13670985"/>
+            <a:ext cx="8272735" cy="17924257"/>
+            <a:chOff x="34727556" y="13783755"/>
+            <a:chExt cx="8272735" cy="17924257"/>
+          </a:xfrm>
+        </p:grpSpPr>
+        <p:pic>
+          <p:nvPicPr>
+            <p:cNvPr id="45" name="Picture 44" descr="A graph with numbers and lines&#10;&#10;Description automatically generated with medium confidence">
+              <a:extLst>
+                <a:ext uri="{FF2B5EF4-FFF2-40B4-BE49-F238E27FC236}">
+                  <a16:creationId xmlns:a16="http://schemas.microsoft.com/office/drawing/2014/main" id="{C86CC911-EC61-5B5B-59BC-AE99C4EDDBCD}"/>
+                </a:ext>
+              </a:extLst>
+            </p:cNvPr>
+            <p:cNvPicPr>
+              <a:picLocks noChangeAspect="1"/>
+            </p:cNvPicPr>
+            <p:nvPr/>
+          </p:nvPicPr>
+          <p:blipFill>
+            <a:blip r:embed="rId21">
+              <a:extLst>
+                <a:ext uri="{28A0092B-C50C-407E-A947-70E740481C1C}">
+                  <a14:useLocalDpi xmlns:a14="http://schemas.microsoft.com/office/drawing/2010/main" val="0"/>
+                </a:ext>
+              </a:extLst>
+            </a:blip>
+            <a:stretch>
+              <a:fillRect/>
+            </a:stretch>
+          </p:blipFill>
+          <p:spPr>
+            <a:xfrm>
+              <a:off x="34727556" y="13783755"/>
+              <a:ext cx="8272735" cy="17924257"/>
+            </a:xfrm>
+            <a:prstGeom prst="rect">
+              <a:avLst/>
+            </a:prstGeom>
+          </p:spPr>
+        </p:pic>
+        <p:sp>
+          <p:nvSpPr>
+            <p:cNvPr id="46" name="Rectangle 45">
+              <a:extLst>
+                <a:ext uri="{FF2B5EF4-FFF2-40B4-BE49-F238E27FC236}">
+                  <a16:creationId xmlns:a16="http://schemas.microsoft.com/office/drawing/2014/main" id="{BCAF4416-86F4-372E-D491-6437C7538128}"/>
+                </a:ext>
+              </a:extLst>
+            </p:cNvPr>
+            <p:cNvSpPr/>
+            <p:nvPr/>
+          </p:nvSpPr>
+          <p:spPr>
+            <a:xfrm>
+              <a:off x="35408383" y="29320662"/>
+              <a:ext cx="1294226" cy="1043627"/>
+            </a:xfrm>
+            <a:prstGeom prst="rect">
+              <a:avLst/>
+            </a:prstGeom>
+            <a:noFill/>
+            <a:ln w="76200">
+              <a:solidFill>
+                <a:srgbClr val="64CBE8"/>
+              </a:solidFill>
+            </a:ln>
+          </p:spPr>
+          <p:style>
+            <a:lnRef idx="2">
+              <a:schemeClr val="accent1">
+                <a:shade val="15000"/>
+              </a:schemeClr>
+            </a:lnRef>
+            <a:fillRef idx="1">
+              <a:schemeClr val="accent1"/>
+            </a:fillRef>
+            <a:effectRef idx="0">
+              <a:schemeClr val="accent1"/>
+            </a:effectRef>
+            <a:fontRef idx="minor">
+              <a:schemeClr val="lt1"/>
+            </a:fontRef>
+          </p:style>
+          <p:txBody>
+            <a:bodyPr rtlCol="0" anchor="ctr"/>
+            <a:lstStyle/>
+            <a:p>
+              <a:pPr algn="ctr"/>
+              <a:endParaRPr lang="en-GB"/>
+            </a:p>
+          </p:txBody>
+        </p:sp>
+        <p:sp>
+          <p:nvSpPr>
+            <p:cNvPr id="47" name="Rectangle 46">
+              <a:extLst>
+                <a:ext uri="{FF2B5EF4-FFF2-40B4-BE49-F238E27FC236}">
+                  <a16:creationId xmlns:a16="http://schemas.microsoft.com/office/drawing/2014/main" id="{67905DA1-F80F-0AD2-5454-B56D04F09034}"/>
+                </a:ext>
+              </a:extLst>
+            </p:cNvPr>
+            <p:cNvSpPr/>
+            <p:nvPr/>
+          </p:nvSpPr>
+          <p:spPr>
+            <a:xfrm>
+              <a:off x="35408383" y="28240662"/>
+              <a:ext cx="1294226" cy="370860"/>
+            </a:xfrm>
+            <a:prstGeom prst="rect">
+              <a:avLst/>
+            </a:prstGeom>
+            <a:noFill/>
+            <a:ln w="76200">
+              <a:solidFill>
+                <a:srgbClr val="64CBE8"/>
+              </a:solidFill>
+            </a:ln>
+          </p:spPr>
+          <p:style>
+            <a:lnRef idx="2">
+              <a:schemeClr val="accent1">
+                <a:shade val="15000"/>
+              </a:schemeClr>
+            </a:lnRef>
+            <a:fillRef idx="1">
+              <a:schemeClr val="accent1"/>
+            </a:fillRef>
+            <a:effectRef idx="0">
+              <a:schemeClr val="accent1"/>
+            </a:effectRef>
+            <a:fontRef idx="minor">
+              <a:schemeClr val="lt1"/>
+            </a:fontRef>
+          </p:style>
+          <p:txBody>
+            <a:bodyPr rtlCol="0" anchor="ctr"/>
+            <a:lstStyle/>
+            <a:p>
+              <a:pPr algn="ctr"/>
+              <a:endParaRPr lang="en-GB"/>
+            </a:p>
+          </p:txBody>
+        </p:sp>
+        <p:sp>
+          <p:nvSpPr>
+            <p:cNvPr id="48" name="Rectangle 47">
+              <a:extLst>
+                <a:ext uri="{FF2B5EF4-FFF2-40B4-BE49-F238E27FC236}">
+                  <a16:creationId xmlns:a16="http://schemas.microsoft.com/office/drawing/2014/main" id="{D282B582-6AB1-91D5-4721-726023D24A5E}"/>
+                </a:ext>
+              </a:extLst>
+            </p:cNvPr>
+            <p:cNvSpPr/>
+            <p:nvPr/>
+          </p:nvSpPr>
+          <p:spPr>
+            <a:xfrm>
+              <a:off x="35408383" y="27060387"/>
+              <a:ext cx="1294226" cy="370860"/>
+            </a:xfrm>
+            <a:prstGeom prst="rect">
+              <a:avLst/>
+            </a:prstGeom>
+            <a:noFill/>
+            <a:ln w="76200">
+              <a:solidFill>
+                <a:srgbClr val="64CBE8"/>
+              </a:solidFill>
+            </a:ln>
+          </p:spPr>
+          <p:style>
+            <a:lnRef idx="2">
+              <a:schemeClr val="accent1">
+                <a:shade val="15000"/>
+              </a:schemeClr>
+            </a:lnRef>
+            <a:fillRef idx="1">
+              <a:schemeClr val="accent1"/>
+            </a:fillRef>
+            <a:effectRef idx="0">
+              <a:schemeClr val="accent1"/>
+            </a:effectRef>
+            <a:fontRef idx="minor">
+              <a:schemeClr val="lt1"/>
+            </a:fontRef>
+          </p:style>
+          <p:txBody>
+            <a:bodyPr rtlCol="0" anchor="ctr"/>
+            <a:lstStyle/>
+            <a:p>
+              <a:pPr algn="ctr"/>
+              <a:endParaRPr lang="en-GB"/>
+            </a:p>
+          </p:txBody>
+        </p:sp>
+        <p:sp>
+          <p:nvSpPr>
+            <p:cNvPr id="49" name="Rectangle 48">
+              <a:extLst>
+                <a:ext uri="{FF2B5EF4-FFF2-40B4-BE49-F238E27FC236}">
+                  <a16:creationId xmlns:a16="http://schemas.microsoft.com/office/drawing/2014/main" id="{FEA0A799-3D98-0342-53A1-AB5E968AB819}"/>
+                </a:ext>
+              </a:extLst>
+            </p:cNvPr>
+            <p:cNvSpPr/>
+            <p:nvPr/>
+          </p:nvSpPr>
+          <p:spPr>
+            <a:xfrm>
+              <a:off x="35408383" y="21814282"/>
+              <a:ext cx="1294226" cy="1636561"/>
+            </a:xfrm>
+            <a:prstGeom prst="rect">
+              <a:avLst/>
+            </a:prstGeom>
+            <a:noFill/>
+            <a:ln w="76200">
+              <a:solidFill>
+                <a:srgbClr val="64CBE8"/>
+              </a:solidFill>
+            </a:ln>
+          </p:spPr>
+          <p:style>
+            <a:lnRef idx="2">
+              <a:schemeClr val="accent1">
+                <a:shade val="15000"/>
+              </a:schemeClr>
+            </a:lnRef>
+            <a:fillRef idx="1">
+              <a:schemeClr val="accent1"/>
+            </a:fillRef>
+            <a:effectRef idx="0">
+              <a:schemeClr val="accent1"/>
+            </a:effectRef>
+            <a:fontRef idx="minor">
+              <a:schemeClr val="lt1"/>
+            </a:fontRef>
+          </p:style>
+          <p:txBody>
+            <a:bodyPr rtlCol="0" anchor="ctr"/>
+            <a:lstStyle/>
+            <a:p>
+              <a:pPr algn="ctr"/>
+              <a:endParaRPr lang="en-GB"/>
+            </a:p>
+          </p:txBody>
+        </p:sp>
+        <p:sp>
+          <p:nvSpPr>
+            <p:cNvPr id="50" name="Rectangle 49">
+              <a:extLst>
+                <a:ext uri="{FF2B5EF4-FFF2-40B4-BE49-F238E27FC236}">
+                  <a16:creationId xmlns:a16="http://schemas.microsoft.com/office/drawing/2014/main" id="{4BA7BE10-5B38-5681-CB4A-90CAA346E26D}"/>
+                </a:ext>
+              </a:extLst>
+            </p:cNvPr>
+            <p:cNvSpPr/>
+            <p:nvPr/>
+          </p:nvSpPr>
+          <p:spPr>
+            <a:xfrm>
+              <a:off x="35408383" y="16535292"/>
+              <a:ext cx="1294226" cy="4580313"/>
+            </a:xfrm>
+            <a:prstGeom prst="rect">
+              <a:avLst/>
+            </a:prstGeom>
+            <a:noFill/>
+            <a:ln w="76200">
+              <a:solidFill>
+                <a:srgbClr val="64CBE8"/>
+              </a:solidFill>
+            </a:ln>
+          </p:spPr>
+          <p:style>
+            <a:lnRef idx="2">
+              <a:schemeClr val="accent1">
+                <a:shade val="15000"/>
+              </a:schemeClr>
+            </a:lnRef>
+            <a:fillRef idx="1">
+              <a:schemeClr val="accent1"/>
+            </a:fillRef>
+            <a:effectRef idx="0">
+              <a:schemeClr val="accent1"/>
+            </a:effectRef>
+            <a:fontRef idx="minor">
+              <a:schemeClr val="lt1"/>
+            </a:fontRef>
+          </p:style>
+          <p:txBody>
+            <a:bodyPr rtlCol="0" anchor="ctr"/>
+            <a:lstStyle/>
+            <a:p>
+              <a:pPr algn="ctr"/>
+              <a:endParaRPr lang="en-GB"/>
+            </a:p>
+          </p:txBody>
+        </p:sp>
+        <p:sp>
+          <p:nvSpPr>
+            <p:cNvPr id="51" name="Rectangle 50">
+              <a:extLst>
+                <a:ext uri="{FF2B5EF4-FFF2-40B4-BE49-F238E27FC236}">
+                  <a16:creationId xmlns:a16="http://schemas.microsoft.com/office/drawing/2014/main" id="{E4C68094-C0DE-49BF-542F-EC6D4D09ED41}"/>
+                </a:ext>
+              </a:extLst>
+            </p:cNvPr>
+            <p:cNvSpPr/>
+            <p:nvPr/>
+          </p:nvSpPr>
+          <p:spPr>
+            <a:xfrm>
+              <a:off x="35408383" y="25314576"/>
+              <a:ext cx="1294226" cy="370860"/>
+            </a:xfrm>
+            <a:prstGeom prst="rect">
+              <a:avLst/>
+            </a:prstGeom>
+            <a:noFill/>
+            <a:ln w="76200">
+              <a:solidFill>
+                <a:srgbClr val="64CBE8"/>
+              </a:solidFill>
+            </a:ln>
+          </p:spPr>
+          <p:style>
+            <a:lnRef idx="2">
+              <a:schemeClr val="accent1">
+                <a:shade val="15000"/>
+              </a:schemeClr>
+            </a:lnRef>
+            <a:fillRef idx="1">
+              <a:schemeClr val="accent1"/>
+            </a:fillRef>
+            <a:effectRef idx="0">
+              <a:schemeClr val="accent1"/>
+            </a:effectRef>
+            <a:fontRef idx="minor">
+              <a:schemeClr val="lt1"/>
+            </a:fontRef>
+          </p:style>
+          <p:txBody>
+            <a:bodyPr rtlCol="0" anchor="ctr"/>
+            <a:lstStyle/>
+            <a:p>
+              <a:pPr algn="ctr"/>
+              <a:endParaRPr lang="en-GB"/>
+            </a:p>
+          </p:txBody>
+        </p:sp>
+      </p:grpSp>
+      <p:grpSp>
+        <p:nvGrpSpPr>
+          <p:cNvPr id="61" name="Group 60">
+            <a:extLst>
+              <a:ext uri="{FF2B5EF4-FFF2-40B4-BE49-F238E27FC236}">
+                <a16:creationId xmlns:a16="http://schemas.microsoft.com/office/drawing/2014/main" id="{9C883754-6270-FADE-0753-1EB4A2D335C7}"/>
+              </a:ext>
+            </a:extLst>
+          </p:cNvPr>
+          <p:cNvGrpSpPr/>
+          <p:nvPr/>
+        </p:nvGrpSpPr>
+        <p:grpSpPr>
+          <a:xfrm>
+            <a:off x="52856907" y="13651034"/>
+            <a:ext cx="8272735" cy="17924256"/>
+            <a:chOff x="52856907" y="13651034"/>
+            <a:chExt cx="8272735" cy="17924256"/>
+          </a:xfrm>
+        </p:grpSpPr>
+        <p:pic>
+          <p:nvPicPr>
+            <p:cNvPr id="54" name="Picture 53" descr="A graph of a number of dots and lines&#10;&#10;Description automatically generated with medium confidence">
+              <a:extLst>
+                <a:ext uri="{FF2B5EF4-FFF2-40B4-BE49-F238E27FC236}">
+                  <a16:creationId xmlns:a16="http://schemas.microsoft.com/office/drawing/2014/main" id="{DDEC2E7B-6C0B-0B7A-C55B-F067A5DE0DA3}"/>
+                </a:ext>
+              </a:extLst>
+            </p:cNvPr>
+            <p:cNvPicPr>
+              <a:picLocks noChangeAspect="1"/>
+            </p:cNvPicPr>
+            <p:nvPr/>
+          </p:nvPicPr>
+          <p:blipFill>
+            <a:blip r:embed="rId22">
+              <a:extLst>
+                <a:ext uri="{28A0092B-C50C-407E-A947-70E740481C1C}">
+                  <a14:useLocalDpi xmlns:a14="http://schemas.microsoft.com/office/drawing/2010/main" val="0"/>
+                </a:ext>
+              </a:extLst>
+            </a:blip>
+            <a:stretch>
+              <a:fillRect/>
+            </a:stretch>
+          </p:blipFill>
+          <p:spPr>
+            <a:xfrm>
+              <a:off x="52856907" y="13651034"/>
+              <a:ext cx="8272735" cy="17924256"/>
+            </a:xfrm>
+            <a:prstGeom prst="rect">
+              <a:avLst/>
+            </a:prstGeom>
+          </p:spPr>
+        </p:pic>
+        <p:sp>
+          <p:nvSpPr>
+            <p:cNvPr id="55" name="Rectangle 54">
+              <a:extLst>
+                <a:ext uri="{FF2B5EF4-FFF2-40B4-BE49-F238E27FC236}">
+                  <a16:creationId xmlns:a16="http://schemas.microsoft.com/office/drawing/2014/main" id="{982A433F-E533-9DB2-3F8C-3E847A55535D}"/>
+                </a:ext>
+              </a:extLst>
+            </p:cNvPr>
+            <p:cNvSpPr/>
+            <p:nvPr/>
+          </p:nvSpPr>
+          <p:spPr>
+            <a:xfrm>
+              <a:off x="53477769" y="26323959"/>
+              <a:ext cx="1294226" cy="3927559"/>
+            </a:xfrm>
+            <a:prstGeom prst="rect">
+              <a:avLst/>
+            </a:prstGeom>
+            <a:noFill/>
+            <a:ln w="76200">
+              <a:solidFill>
+                <a:srgbClr val="64CBE8"/>
+              </a:solidFill>
+            </a:ln>
+          </p:spPr>
+          <p:style>
+            <a:lnRef idx="2">
+              <a:schemeClr val="accent1">
+                <a:shade val="15000"/>
+              </a:schemeClr>
+            </a:lnRef>
+            <a:fillRef idx="1">
+              <a:schemeClr val="accent1"/>
+            </a:fillRef>
+            <a:effectRef idx="0">
+              <a:schemeClr val="accent1"/>
+            </a:effectRef>
+            <a:fontRef idx="minor">
+              <a:schemeClr val="lt1"/>
+            </a:fontRef>
+          </p:style>
+          <p:txBody>
+            <a:bodyPr rtlCol="0" anchor="ctr"/>
+            <a:lstStyle/>
+            <a:p>
+              <a:pPr algn="ctr"/>
+              <a:endParaRPr lang="en-GB"/>
+            </a:p>
+          </p:txBody>
+        </p:sp>
+        <p:sp>
+          <p:nvSpPr>
+            <p:cNvPr id="56" name="Rectangle 55">
+              <a:extLst>
+                <a:ext uri="{FF2B5EF4-FFF2-40B4-BE49-F238E27FC236}">
+                  <a16:creationId xmlns:a16="http://schemas.microsoft.com/office/drawing/2014/main" id="{ADB2E19D-86BC-0501-3F9C-AC5CDA14790C}"/>
+                </a:ext>
+              </a:extLst>
+            </p:cNvPr>
+            <p:cNvSpPr/>
+            <p:nvPr/>
+          </p:nvSpPr>
+          <p:spPr>
+            <a:xfrm>
+              <a:off x="53477769" y="23978795"/>
+              <a:ext cx="1294226" cy="1593871"/>
+            </a:xfrm>
+            <a:prstGeom prst="rect">
+              <a:avLst/>
+            </a:prstGeom>
+            <a:noFill/>
+            <a:ln w="76200">
+              <a:solidFill>
+                <a:srgbClr val="64CBE8"/>
+              </a:solidFill>
+            </a:ln>
+          </p:spPr>
+          <p:style>
+            <a:lnRef idx="2">
+              <a:schemeClr val="accent1">
+                <a:shade val="15000"/>
+              </a:schemeClr>
+            </a:lnRef>
+            <a:fillRef idx="1">
+              <a:schemeClr val="accent1"/>
+            </a:fillRef>
+            <a:effectRef idx="0">
+              <a:schemeClr val="accent1"/>
+            </a:effectRef>
+            <a:fontRef idx="minor">
+              <a:schemeClr val="lt1"/>
+            </a:fontRef>
+          </p:style>
+          <p:txBody>
+            <a:bodyPr rtlCol="0" anchor="ctr"/>
+            <a:lstStyle/>
+            <a:p>
+              <a:pPr algn="ctr"/>
+              <a:endParaRPr lang="en-GB"/>
+            </a:p>
+          </p:txBody>
+        </p:sp>
+        <p:sp>
+          <p:nvSpPr>
+            <p:cNvPr id="57" name="Rectangle 56">
+              <a:extLst>
+                <a:ext uri="{FF2B5EF4-FFF2-40B4-BE49-F238E27FC236}">
+                  <a16:creationId xmlns:a16="http://schemas.microsoft.com/office/drawing/2014/main" id="{5F4CF5D6-A5F1-A8AE-12DD-CCDBD4D7C820}"/>
+                </a:ext>
+              </a:extLst>
+            </p:cNvPr>
+            <p:cNvSpPr/>
+            <p:nvPr/>
+          </p:nvSpPr>
+          <p:spPr>
+            <a:xfrm>
+              <a:off x="53477769" y="22257572"/>
+              <a:ext cx="1294226" cy="971723"/>
+            </a:xfrm>
+            <a:prstGeom prst="rect">
+              <a:avLst/>
+            </a:prstGeom>
+            <a:noFill/>
+            <a:ln w="76200">
+              <a:solidFill>
+                <a:srgbClr val="64CBE8"/>
+              </a:solidFill>
+            </a:ln>
+          </p:spPr>
+          <p:style>
+            <a:lnRef idx="2">
+              <a:schemeClr val="accent1">
+                <a:shade val="15000"/>
+              </a:schemeClr>
+            </a:lnRef>
+            <a:fillRef idx="1">
+              <a:schemeClr val="accent1"/>
+            </a:fillRef>
+            <a:effectRef idx="0">
+              <a:schemeClr val="accent1"/>
+            </a:effectRef>
+            <a:fontRef idx="minor">
+              <a:schemeClr val="lt1"/>
+            </a:fontRef>
+          </p:style>
+          <p:txBody>
+            <a:bodyPr rtlCol="0" anchor="ctr"/>
+            <a:lstStyle/>
+            <a:p>
+              <a:pPr algn="ctr"/>
+              <a:endParaRPr lang="en-GB"/>
+            </a:p>
+          </p:txBody>
+        </p:sp>
+        <p:sp>
+          <p:nvSpPr>
+            <p:cNvPr id="58" name="Rectangle 57">
+              <a:extLst>
+                <a:ext uri="{FF2B5EF4-FFF2-40B4-BE49-F238E27FC236}">
+                  <a16:creationId xmlns:a16="http://schemas.microsoft.com/office/drawing/2014/main" id="{8587D201-F494-6507-455A-27320E1063F1}"/>
+                </a:ext>
+              </a:extLst>
+            </p:cNvPr>
+            <p:cNvSpPr/>
+            <p:nvPr/>
+          </p:nvSpPr>
+          <p:spPr>
+            <a:xfrm>
+              <a:off x="53477769" y="20486324"/>
+              <a:ext cx="1294226" cy="971723"/>
+            </a:xfrm>
+            <a:prstGeom prst="rect">
+              <a:avLst/>
+            </a:prstGeom>
+            <a:noFill/>
+            <a:ln w="76200">
+              <a:solidFill>
+                <a:srgbClr val="64CBE8"/>
+              </a:solidFill>
+            </a:ln>
+          </p:spPr>
+          <p:style>
+            <a:lnRef idx="2">
+              <a:schemeClr val="accent1">
+                <a:shade val="15000"/>
+              </a:schemeClr>
+            </a:lnRef>
+            <a:fillRef idx="1">
+              <a:schemeClr val="accent1"/>
+            </a:fillRef>
+            <a:effectRef idx="0">
+              <a:schemeClr val="accent1"/>
+            </a:effectRef>
+            <a:fontRef idx="minor">
+              <a:schemeClr val="lt1"/>
+            </a:fontRef>
+          </p:style>
+          <p:txBody>
+            <a:bodyPr rtlCol="0" anchor="ctr"/>
+            <a:lstStyle/>
+            <a:p>
+              <a:pPr algn="ctr"/>
+              <a:endParaRPr lang="en-GB"/>
+            </a:p>
+          </p:txBody>
+        </p:sp>
+        <p:sp>
+          <p:nvSpPr>
+            <p:cNvPr id="59" name="Rectangle 58">
+              <a:extLst>
+                <a:ext uri="{FF2B5EF4-FFF2-40B4-BE49-F238E27FC236}">
+                  <a16:creationId xmlns:a16="http://schemas.microsoft.com/office/drawing/2014/main" id="{259CC3D9-6FCE-4463-D52E-F33BC2AD34DA}"/>
+                </a:ext>
+              </a:extLst>
+            </p:cNvPr>
+            <p:cNvSpPr/>
+            <p:nvPr/>
+          </p:nvSpPr>
+          <p:spPr>
+            <a:xfrm>
+              <a:off x="53477769" y="19313075"/>
+              <a:ext cx="1294226" cy="410915"/>
+            </a:xfrm>
+            <a:prstGeom prst="rect">
+              <a:avLst/>
+            </a:prstGeom>
+            <a:noFill/>
+            <a:ln w="76200">
+              <a:solidFill>
+                <a:srgbClr val="64CBE8"/>
+              </a:solidFill>
+            </a:ln>
+          </p:spPr>
+          <p:style>
+            <a:lnRef idx="2">
+              <a:schemeClr val="accent1">
+                <a:shade val="15000"/>
+              </a:schemeClr>
+            </a:lnRef>
+            <a:fillRef idx="1">
+              <a:schemeClr val="accent1"/>
+            </a:fillRef>
+            <a:effectRef idx="0">
+              <a:schemeClr val="accent1"/>
+            </a:effectRef>
+            <a:fontRef idx="minor">
+              <a:schemeClr val="lt1"/>
+            </a:fontRef>
+          </p:style>
+          <p:txBody>
+            <a:bodyPr rtlCol="0" anchor="ctr"/>
+            <a:lstStyle/>
+            <a:p>
+              <a:pPr algn="ctr"/>
+              <a:endParaRPr lang="en-GB" dirty="0"/>
+            </a:p>
+          </p:txBody>
+        </p:sp>
+        <p:sp>
+          <p:nvSpPr>
+            <p:cNvPr id="60" name="Rectangle 59">
+              <a:extLst>
+                <a:ext uri="{FF2B5EF4-FFF2-40B4-BE49-F238E27FC236}">
+                  <a16:creationId xmlns:a16="http://schemas.microsoft.com/office/drawing/2014/main" id="{EE837257-DCC7-D3C2-3C7A-478444C774F8}"/>
+                </a:ext>
+              </a:extLst>
+            </p:cNvPr>
+            <p:cNvSpPr/>
+            <p:nvPr/>
+          </p:nvSpPr>
+          <p:spPr>
+            <a:xfrm>
+              <a:off x="53477769" y="16459200"/>
+              <a:ext cx="1294226" cy="1530103"/>
+            </a:xfrm>
+            <a:prstGeom prst="rect">
+              <a:avLst/>
+            </a:prstGeom>
+            <a:noFill/>
+            <a:ln w="76200">
+              <a:solidFill>
+                <a:srgbClr val="64CBE8"/>
+              </a:solidFill>
+            </a:ln>
+          </p:spPr>
+          <p:style>
+            <a:lnRef idx="2">
+              <a:schemeClr val="accent1">
+                <a:shade val="15000"/>
+              </a:schemeClr>
+            </a:lnRef>
+            <a:fillRef idx="1">
+              <a:schemeClr val="accent1"/>
+            </a:fillRef>
+            <a:effectRef idx="0">
+              <a:schemeClr val="accent1"/>
+            </a:effectRef>
+            <a:fontRef idx="minor">
+              <a:schemeClr val="lt1"/>
+            </a:fontRef>
+          </p:style>
+          <p:txBody>
+            <a:bodyPr rtlCol="0" anchor="ctr"/>
+            <a:lstStyle/>
+            <a:p>
+              <a:pPr algn="ctr"/>
+              <a:endParaRPr lang="en-GB"/>
+            </a:p>
+          </p:txBody>
+        </p:sp>
+      </p:grpSp>
+      <p:grpSp>
+        <p:nvGrpSpPr>
+          <p:cNvPr id="65" name="Group 64">
+            <a:extLst>
+              <a:ext uri="{FF2B5EF4-FFF2-40B4-BE49-F238E27FC236}">
+                <a16:creationId xmlns:a16="http://schemas.microsoft.com/office/drawing/2014/main" id="{A52E242A-CD87-1F41-4D17-708E26A9087A}"/>
+              </a:ext>
+            </a:extLst>
+          </p:cNvPr>
+          <p:cNvGrpSpPr/>
+          <p:nvPr/>
+        </p:nvGrpSpPr>
+        <p:grpSpPr>
+          <a:xfrm>
+            <a:off x="33816499" y="4850917"/>
+            <a:ext cx="9082800" cy="8655061"/>
+            <a:chOff x="33888676" y="4800879"/>
+            <a:chExt cx="9082800" cy="8655061"/>
           </a:xfrm>
         </p:grpSpPr>
         <p:grpSp>
           <p:nvGrpSpPr>
-            <p:cNvPr id="28" name="Group 27">
+            <p:cNvPr id="40" name="Group 39">
               <a:extLst>
                 <a:ext uri="{FF2B5EF4-FFF2-40B4-BE49-F238E27FC236}">
-                  <a16:creationId xmlns:a16="http://schemas.microsoft.com/office/drawing/2014/main" id="{D57ABC19-E6CE-88F2-B4E9-9D83A95831A8}"/>
+                  <a16:creationId xmlns:a16="http://schemas.microsoft.com/office/drawing/2014/main" id="{6CA30F34-051E-D831-84FB-58331044195E}"/>
                 </a:ext>
               </a:extLst>
             </p:cNvPr>
@@ -6164,18 +7095,18 @@
           </p:nvGrpSpPr>
           <p:grpSpPr>
             <a:xfrm>
-              <a:off x="34517936" y="4677738"/>
-              <a:ext cx="8649202" cy="8243997"/>
-              <a:chOff x="34517936" y="4677738"/>
-              <a:chExt cx="8649202" cy="8243997"/>
+              <a:off x="33888676" y="4800879"/>
+              <a:ext cx="9082800" cy="8655061"/>
+              <a:chOff x="33888676" y="4800879"/>
+              <a:chExt cx="9082800" cy="8655061"/>
             </a:xfrm>
           </p:grpSpPr>
           <p:pic>
             <p:nvPicPr>
-              <p:cNvPr id="21" name="Picture 20">
+              <p:cNvPr id="39" name="Picture 38" descr="A graph showing a graph of correct and filler&#10;&#10;Description automatically generated">
                 <a:extLst>
                   <a:ext uri="{FF2B5EF4-FFF2-40B4-BE49-F238E27FC236}">
-                    <a16:creationId xmlns:a16="http://schemas.microsoft.com/office/drawing/2014/main" id="{A37BB1A9-43C3-9DB6-1629-AC2B18EB486B}"/>
+                    <a16:creationId xmlns:a16="http://schemas.microsoft.com/office/drawing/2014/main" id="{73774C4B-1071-D02B-5092-7D2E1D95428B}"/>
                   </a:ext>
                 </a:extLst>
               </p:cNvPr>
@@ -6184,15 +7115,692 @@
               </p:cNvPicPr>
               <p:nvPr/>
             </p:nvPicPr>
-            <p:blipFill>
-              <a:blip r:embed="rId21"/>
-              <a:srcRect l="8564" t="3758" b="15873"/>
+            <p:blipFill rotWithShape="1">
+              <a:blip r:embed="rId23">
+                <a:extLst>
+                  <a:ext uri="{28A0092B-C50C-407E-A947-70E740481C1C}">
+                    <a14:useLocalDpi xmlns:a14="http://schemas.microsoft.com/office/drawing/2010/main" val="0"/>
+                  </a:ext>
+                </a:extLst>
+              </a:blip>
+              <a:srcRect b="8183"/>
               <a:stretch/>
             </p:blipFill>
             <p:spPr>
               <a:xfrm>
-                <a:off x="35318287" y="4677738"/>
-                <a:ext cx="7848851" cy="7200000"/>
+                <a:off x="33892563" y="5119950"/>
+                <a:ext cx="9078913" cy="8335990"/>
+              </a:xfrm>
+              <a:prstGeom prst="rect">
+                <a:avLst/>
+              </a:prstGeom>
+            </p:spPr>
+          </p:pic>
+          <p:grpSp>
+            <p:nvGrpSpPr>
+              <p:cNvPr id="36" name="Group 35">
+                <a:extLst>
+                  <a:ext uri="{FF2B5EF4-FFF2-40B4-BE49-F238E27FC236}">
+                    <a16:creationId xmlns:a16="http://schemas.microsoft.com/office/drawing/2014/main" id="{33E6E6AF-38A8-5578-508E-F8837F2361DA}"/>
+                  </a:ext>
+                </a:extLst>
+              </p:cNvPr>
+              <p:cNvGrpSpPr/>
+              <p:nvPr/>
+            </p:nvGrpSpPr>
+            <p:grpSpPr>
+              <a:xfrm>
+                <a:off x="33888676" y="4800879"/>
+                <a:ext cx="9082800" cy="809486"/>
+                <a:chOff x="33728069" y="4758350"/>
+                <a:chExt cx="9082800" cy="809486"/>
+              </a:xfrm>
+            </p:grpSpPr>
+            <p:sp>
+              <p:nvSpPr>
+                <p:cNvPr id="35" name="Rectangle 34">
+                  <a:extLst>
+                    <a:ext uri="{FF2B5EF4-FFF2-40B4-BE49-F238E27FC236}">
+                      <a16:creationId xmlns:a16="http://schemas.microsoft.com/office/drawing/2014/main" id="{55949B42-2C60-A27F-7704-E8F8D5585F6E}"/>
+                    </a:ext>
+                  </a:extLst>
+                </p:cNvPr>
+                <p:cNvSpPr/>
+                <p:nvPr/>
+              </p:nvSpPr>
+              <p:spPr>
+                <a:xfrm>
+                  <a:off x="33728069" y="4823421"/>
+                  <a:ext cx="9082800" cy="360000"/>
+                </a:xfrm>
+                <a:prstGeom prst="rect">
+                  <a:avLst/>
+                </a:prstGeom>
+                <a:solidFill>
+                  <a:srgbClr val="FFFFFF"/>
+                </a:solidFill>
+                <a:ln>
+                  <a:noFill/>
+                </a:ln>
+              </p:spPr>
+              <p:style>
+                <a:lnRef idx="2">
+                  <a:schemeClr val="accent1">
+                    <a:shade val="15000"/>
+                  </a:schemeClr>
+                </a:lnRef>
+                <a:fillRef idx="1">
+                  <a:schemeClr val="accent1"/>
+                </a:fillRef>
+                <a:effectRef idx="0">
+                  <a:schemeClr val="accent1"/>
+                </a:effectRef>
+                <a:fontRef idx="minor">
+                  <a:schemeClr val="lt1"/>
+                </a:fontRef>
+              </p:style>
+              <p:txBody>
+                <a:bodyPr rtlCol="0" anchor="ctr"/>
+                <a:lstStyle/>
+                <a:p>
+                  <a:pPr algn="ctr"/>
+                  <a:endParaRPr lang="en-GB" dirty="0"/>
+                </a:p>
+              </p:txBody>
+            </p:sp>
+            <p:grpSp>
+              <p:nvGrpSpPr>
+                <p:cNvPr id="33" name="Group 32">
+                  <a:extLst>
+                    <a:ext uri="{FF2B5EF4-FFF2-40B4-BE49-F238E27FC236}">
+                      <a16:creationId xmlns:a16="http://schemas.microsoft.com/office/drawing/2014/main" id="{E929CBCD-3CC4-2A54-7CF0-3E83C873D97F}"/>
+                    </a:ext>
+                  </a:extLst>
+                </p:cNvPr>
+                <p:cNvGrpSpPr/>
+                <p:nvPr/>
+              </p:nvGrpSpPr>
+              <p:grpSpPr>
+                <a:xfrm>
+                  <a:off x="37776371" y="5387836"/>
+                  <a:ext cx="2993865" cy="180000"/>
+                  <a:chOff x="37776371" y="5221580"/>
+                  <a:chExt cx="2993865" cy="180000"/>
+                </a:xfrm>
+              </p:grpSpPr>
+              <p:cxnSp>
+                <p:nvCxnSpPr>
+                  <p:cNvPr id="17" name="Straight Connector 16">
+                    <a:extLst>
+                      <a:ext uri="{FF2B5EF4-FFF2-40B4-BE49-F238E27FC236}">
+                        <a16:creationId xmlns:a16="http://schemas.microsoft.com/office/drawing/2014/main" id="{7B33D5D5-1247-0C95-CEDF-6C67BDC58E0C}"/>
+                      </a:ext>
+                    </a:extLst>
+                  </p:cNvPr>
+                  <p:cNvCxnSpPr>
+                    <a:cxnSpLocks/>
+                  </p:cNvCxnSpPr>
+                  <p:nvPr/>
+                </p:nvCxnSpPr>
+                <p:spPr>
+                  <a:xfrm>
+                    <a:off x="37776371" y="5260419"/>
+                    <a:ext cx="2993865" cy="0"/>
+                  </a:xfrm>
+                  <a:prstGeom prst="line">
+                    <a:avLst/>
+                  </a:prstGeom>
+                  <a:ln w="76200">
+                    <a:solidFill>
+                      <a:srgbClr val="131E29"/>
+                    </a:solidFill>
+                  </a:ln>
+                </p:spPr>
+                <p:style>
+                  <a:lnRef idx="3">
+                    <a:schemeClr val="dk1"/>
+                  </a:lnRef>
+                  <a:fillRef idx="0">
+                    <a:schemeClr val="dk1"/>
+                  </a:fillRef>
+                  <a:effectRef idx="2">
+                    <a:schemeClr val="dk1"/>
+                  </a:effectRef>
+                  <a:fontRef idx="minor">
+                    <a:schemeClr val="tx1"/>
+                  </a:fontRef>
+                </p:style>
+              </p:cxnSp>
+              <p:cxnSp>
+                <p:nvCxnSpPr>
+                  <p:cNvPr id="19" name="Straight Connector 18">
+                    <a:extLst>
+                      <a:ext uri="{FF2B5EF4-FFF2-40B4-BE49-F238E27FC236}">
+                        <a16:creationId xmlns:a16="http://schemas.microsoft.com/office/drawing/2014/main" id="{405DE04F-04BF-5207-A679-F7476D405BF4}"/>
+                      </a:ext>
+                    </a:extLst>
+                  </p:cNvPr>
+                  <p:cNvCxnSpPr>
+                    <a:cxnSpLocks/>
+                  </p:cNvCxnSpPr>
+                  <p:nvPr/>
+                </p:nvCxnSpPr>
+                <p:spPr>
+                  <a:xfrm>
+                    <a:off x="37815206" y="5221580"/>
+                    <a:ext cx="0" cy="180000"/>
+                  </a:xfrm>
+                  <a:prstGeom prst="line">
+                    <a:avLst/>
+                  </a:prstGeom>
+                  <a:ln w="76200">
+                    <a:solidFill>
+                      <a:srgbClr val="131E29"/>
+                    </a:solidFill>
+                  </a:ln>
+                </p:spPr>
+                <p:style>
+                  <a:lnRef idx="3">
+                    <a:schemeClr val="dk1"/>
+                  </a:lnRef>
+                  <a:fillRef idx="0">
+                    <a:schemeClr val="dk1"/>
+                  </a:fillRef>
+                  <a:effectRef idx="2">
+                    <a:schemeClr val="dk1"/>
+                  </a:effectRef>
+                  <a:fontRef idx="minor">
+                    <a:schemeClr val="tx1"/>
+                  </a:fontRef>
+                </p:style>
+              </p:cxnSp>
+              <p:cxnSp>
+                <p:nvCxnSpPr>
+                  <p:cNvPr id="32" name="Straight Connector 31">
+                    <a:extLst>
+                      <a:ext uri="{FF2B5EF4-FFF2-40B4-BE49-F238E27FC236}">
+                        <a16:creationId xmlns:a16="http://schemas.microsoft.com/office/drawing/2014/main" id="{EAE25531-A796-BBA9-407C-D2F69F56F8A3}"/>
+                      </a:ext>
+                    </a:extLst>
+                  </p:cNvPr>
+                  <p:cNvCxnSpPr>
+                    <a:cxnSpLocks/>
+                  </p:cNvCxnSpPr>
+                  <p:nvPr/>
+                </p:nvCxnSpPr>
+                <p:spPr>
+                  <a:xfrm>
+                    <a:off x="40731989" y="5221580"/>
+                    <a:ext cx="0" cy="180000"/>
+                  </a:xfrm>
+                  <a:prstGeom prst="line">
+                    <a:avLst/>
+                  </a:prstGeom>
+                  <a:ln w="76200">
+                    <a:solidFill>
+                      <a:srgbClr val="131E29"/>
+                    </a:solidFill>
+                  </a:ln>
+                </p:spPr>
+                <p:style>
+                  <a:lnRef idx="3">
+                    <a:schemeClr val="dk1"/>
+                  </a:lnRef>
+                  <a:fillRef idx="0">
+                    <a:schemeClr val="dk1"/>
+                  </a:fillRef>
+                  <a:effectRef idx="2">
+                    <a:schemeClr val="dk1"/>
+                  </a:effectRef>
+                  <a:fontRef idx="minor">
+                    <a:schemeClr val="tx1"/>
+                  </a:fontRef>
+                </p:style>
+              </p:cxnSp>
+            </p:grpSp>
+            <p:sp>
+              <p:nvSpPr>
+                <p:cNvPr id="34" name="TextBox 33">
+                  <a:extLst>
+                    <a:ext uri="{FF2B5EF4-FFF2-40B4-BE49-F238E27FC236}">
+                      <a16:creationId xmlns:a16="http://schemas.microsoft.com/office/drawing/2014/main" id="{A0E85D88-06DA-E82C-28F3-04BCB7A85645}"/>
+                    </a:ext>
+                  </a:extLst>
+                </p:cNvPr>
+                <p:cNvSpPr txBox="1"/>
+                <p:nvPr/>
+              </p:nvSpPr>
+              <p:spPr>
+                <a:xfrm>
+                  <a:off x="36598943" y="4758350"/>
+                  <a:ext cx="5348717" cy="707886"/>
+                </a:xfrm>
+                <a:prstGeom prst="rect">
+                  <a:avLst/>
+                </a:prstGeom>
+                <a:noFill/>
+              </p:spPr>
+              <p:txBody>
+                <a:bodyPr wrap="square" rtlCol="0">
+                  <a:spAutoFit/>
+                </a:bodyPr>
+                <a:lstStyle/>
+                <a:p>
+                  <a:pPr algn="ctr"/>
+                  <a:r>
+                    <a:rPr lang="en-GB" sz="4000" b="1" i="1" dirty="0">
+                      <a:latin typeface="Source Sans Pro" panose="020B0503030403020204" pitchFamily="34" charset="0"/>
+                    </a:rPr>
+                    <a:t>p</a:t>
+                  </a:r>
+                  <a:r>
+                    <a:rPr lang="en-GB" sz="4000" b="1" dirty="0">
+                      <a:latin typeface="Source Sans Pro" panose="020B0503030403020204" pitchFamily="34" charset="0"/>
+                    </a:rPr>
+                    <a:t> &lt; .001, BF = 87.20</a:t>
+                  </a:r>
+                </a:p>
+              </p:txBody>
+            </p:sp>
+          </p:grpSp>
+        </p:grpSp>
+        <p:sp>
+          <p:nvSpPr>
+            <p:cNvPr id="62" name="TextBox 61">
+              <a:extLst>
+                <a:ext uri="{FF2B5EF4-FFF2-40B4-BE49-F238E27FC236}">
+                  <a16:creationId xmlns:a16="http://schemas.microsoft.com/office/drawing/2014/main" id="{0513384B-2362-BEF9-3749-62969D006484}"/>
+                </a:ext>
+              </a:extLst>
+            </p:cNvPr>
+            <p:cNvSpPr txBox="1"/>
+            <p:nvPr/>
+          </p:nvSpPr>
+          <p:spPr>
+            <a:xfrm>
+              <a:off x="36759551" y="11176772"/>
+              <a:ext cx="2354854" cy="1323439"/>
+            </a:xfrm>
+            <a:prstGeom prst="rect">
+              <a:avLst/>
+            </a:prstGeom>
+            <a:noFill/>
+          </p:spPr>
+          <p:txBody>
+            <a:bodyPr wrap="square" rtlCol="0">
+              <a:spAutoFit/>
+            </a:bodyPr>
+            <a:lstStyle/>
+            <a:p>
+              <a:pPr algn="ctr"/>
+              <a:r>
+                <a:rPr lang="en-GB" sz="4000" i="1" dirty="0">
+                  <a:latin typeface="Source Sans Pro" panose="020B0503030403020204" pitchFamily="34" charset="0"/>
+                </a:rPr>
+                <a:t>M</a:t>
+              </a:r>
+              <a:r>
+                <a:rPr lang="en-GB" sz="4000" dirty="0">
+                  <a:latin typeface="Source Sans Pro" panose="020B0503030403020204" pitchFamily="34" charset="0"/>
+                </a:rPr>
+                <a:t> = 54.81, </a:t>
+              </a:r>
+            </a:p>
+            <a:p>
+              <a:pPr algn="ctr"/>
+              <a:r>
+                <a:rPr lang="en-GB" sz="4000" i="1" dirty="0">
+                  <a:latin typeface="Source Sans Pro" panose="020B0503030403020204" pitchFamily="34" charset="0"/>
+                </a:rPr>
+                <a:t>SD </a:t>
+              </a:r>
+              <a:r>
+                <a:rPr lang="en-GB" sz="4000" dirty="0">
+                  <a:latin typeface="Source Sans Pro" panose="020B0503030403020204" pitchFamily="34" charset="0"/>
+                </a:rPr>
+                <a:t>= 17.54</a:t>
+              </a:r>
+            </a:p>
+          </p:txBody>
+        </p:sp>
+        <p:sp>
+          <p:nvSpPr>
+            <p:cNvPr id="63" name="TextBox 62">
+              <a:extLst>
+                <a:ext uri="{FF2B5EF4-FFF2-40B4-BE49-F238E27FC236}">
+                  <a16:creationId xmlns:a16="http://schemas.microsoft.com/office/drawing/2014/main" id="{78C32A8A-734C-D30A-D519-28D8F172F072}"/>
+                </a:ext>
+              </a:extLst>
+            </p:cNvPr>
+            <p:cNvSpPr txBox="1"/>
+            <p:nvPr/>
+          </p:nvSpPr>
+          <p:spPr>
+            <a:xfrm>
+              <a:off x="39753415" y="11176771"/>
+              <a:ext cx="2354854" cy="1323439"/>
+            </a:xfrm>
+            <a:prstGeom prst="rect">
+              <a:avLst/>
+            </a:prstGeom>
+            <a:noFill/>
+          </p:spPr>
+          <p:txBody>
+            <a:bodyPr wrap="square" rtlCol="0">
+              <a:spAutoFit/>
+            </a:bodyPr>
+            <a:lstStyle/>
+            <a:p>
+              <a:pPr algn="ctr"/>
+              <a:r>
+                <a:rPr lang="en-GB" sz="4000" i="1" dirty="0">
+                  <a:latin typeface="Source Sans Pro" panose="020B0503030403020204" pitchFamily="34" charset="0"/>
+                </a:rPr>
+                <a:t>M</a:t>
+              </a:r>
+              <a:r>
+                <a:rPr lang="en-GB" sz="4000" dirty="0">
+                  <a:latin typeface="Source Sans Pro" panose="020B0503030403020204" pitchFamily="34" charset="0"/>
+                </a:rPr>
+                <a:t> = 43.67, </a:t>
+              </a:r>
+            </a:p>
+            <a:p>
+              <a:pPr algn="ctr"/>
+              <a:r>
+                <a:rPr lang="en-GB" sz="4000" i="1" dirty="0">
+                  <a:latin typeface="Source Sans Pro" panose="020B0503030403020204" pitchFamily="34" charset="0"/>
+                </a:rPr>
+                <a:t>SD </a:t>
+              </a:r>
+              <a:r>
+                <a:rPr lang="en-GB" sz="4000" dirty="0">
+                  <a:latin typeface="Source Sans Pro" panose="020B0503030403020204" pitchFamily="34" charset="0"/>
+                </a:rPr>
+                <a:t>= 8.46</a:t>
+              </a:r>
+            </a:p>
+          </p:txBody>
+        </p:sp>
+      </p:grpSp>
+      <p:sp>
+        <p:nvSpPr>
+          <p:cNvPr id="68" name="Rectangle 67">
+            <a:extLst>
+              <a:ext uri="{FF2B5EF4-FFF2-40B4-BE49-F238E27FC236}">
+                <a16:creationId xmlns:a16="http://schemas.microsoft.com/office/drawing/2014/main" id="{41C7B20C-4B1C-4FBE-E0DC-F18CDD6F6D58}"/>
+              </a:ext>
+            </a:extLst>
+          </p:cNvPr>
+          <p:cNvSpPr/>
+          <p:nvPr/>
+        </p:nvSpPr>
+        <p:spPr>
+          <a:xfrm>
+            <a:off x="22536041" y="29155682"/>
+            <a:ext cx="20272958" cy="2771657"/>
+          </a:xfrm>
+          <a:prstGeom prst="rect">
+            <a:avLst/>
+          </a:prstGeom>
+          <a:noFill/>
+          <a:ln>
+            <a:noFill/>
+          </a:ln>
+        </p:spPr>
+        <p:style>
+          <a:lnRef idx="2">
+            <a:schemeClr val="accent1">
+              <a:shade val="15000"/>
+            </a:schemeClr>
+          </a:lnRef>
+          <a:fillRef idx="1">
+            <a:schemeClr val="accent1"/>
+          </a:fillRef>
+          <a:effectRef idx="0">
+            <a:schemeClr val="accent1"/>
+          </a:effectRef>
+          <a:fontRef idx="minor">
+            <a:schemeClr val="lt1"/>
+          </a:fontRef>
+        </p:style>
+        <p:txBody>
+          <a:bodyPr rtlCol="0" anchor="ctr"/>
+          <a:lstStyle/>
+          <a:p>
+            <a:pPr marL="685800" indent="-685800">
+              <a:buFont typeface="Arial" panose="020B0604020202020204" pitchFamily="34" charset="0"/>
+              <a:buChar char="•"/>
+            </a:pPr>
+            <a:endParaRPr lang="en-GB" sz="5000" dirty="0">
+              <a:solidFill>
+                <a:srgbClr val="131E29"/>
+              </a:solidFill>
+              <a:latin typeface="Source Sans Pro" panose="020B0503030403020204" pitchFamily="34" charset="0"/>
+            </a:endParaRPr>
+          </a:p>
+        </p:txBody>
+      </p:sp>
+      <p:sp>
+        <p:nvSpPr>
+          <p:cNvPr id="71" name="TextBox 70">
+            <a:extLst>
+              <a:ext uri="{FF2B5EF4-FFF2-40B4-BE49-F238E27FC236}">
+                <a16:creationId xmlns:a16="http://schemas.microsoft.com/office/drawing/2014/main" id="{5851CF78-89AD-2335-A50E-8284789841D8}"/>
+              </a:ext>
+            </a:extLst>
+          </p:cNvPr>
+          <p:cNvSpPr txBox="1"/>
+          <p:nvPr/>
+        </p:nvSpPr>
+        <p:spPr>
+          <a:xfrm>
+            <a:off x="22491549" y="26681267"/>
+            <a:ext cx="19669122" cy="2400657"/>
+          </a:xfrm>
+          <a:prstGeom prst="rect">
+            <a:avLst/>
+          </a:prstGeom>
+          <a:noFill/>
+        </p:spPr>
+        <p:txBody>
+          <a:bodyPr wrap="square">
+            <a:spAutoFit/>
+          </a:bodyPr>
+          <a:lstStyle/>
+          <a:p>
+            <a:pPr marL="685800" indent="-685800">
+              <a:buFont typeface="Arial" panose="020B0604020202020204" pitchFamily="34" charset="0"/>
+              <a:buChar char="•"/>
+            </a:pPr>
+            <a:r>
+              <a:rPr lang="en-GB" sz="5000" dirty="0">
+                <a:solidFill>
+                  <a:srgbClr val="131E29"/>
+                </a:solidFill>
+                <a:latin typeface="Source Sans Pro" panose="020B0503030403020204" pitchFamily="34" charset="0"/>
+              </a:rPr>
+              <a:t>Statistical testing revealed </a:t>
+            </a:r>
+            <a:r>
+              <a:rPr lang="en-GB" sz="5000" b="1" dirty="0">
+                <a:solidFill>
+                  <a:srgbClr val="131E29"/>
+                </a:solidFill>
+                <a:latin typeface="Source Sans Pro" panose="020B0503030403020204" pitchFamily="34" charset="0"/>
+              </a:rPr>
+              <a:t>ambiguous</a:t>
+            </a:r>
+            <a:r>
+              <a:rPr lang="en-GB" sz="5000" dirty="0">
+                <a:solidFill>
+                  <a:srgbClr val="131E29"/>
+                </a:solidFill>
+                <a:latin typeface="Source Sans Pro" panose="020B0503030403020204" pitchFamily="34" charset="0"/>
+              </a:rPr>
+              <a:t> </a:t>
+            </a:r>
+            <a:r>
+              <a:rPr lang="en-GB" sz="5000" b="1" dirty="0">
+                <a:solidFill>
+                  <a:srgbClr val="131E29"/>
+                </a:solidFill>
+                <a:latin typeface="Source Sans Pro" panose="020B0503030403020204" pitchFamily="34" charset="0"/>
+              </a:rPr>
+              <a:t>evidence</a:t>
+            </a:r>
+            <a:r>
+              <a:rPr lang="en-GB" sz="5000" dirty="0">
+                <a:solidFill>
+                  <a:srgbClr val="131E29"/>
+                </a:solidFill>
+                <a:latin typeface="Source Sans Pro" panose="020B0503030403020204" pitchFamily="34" charset="0"/>
+              </a:rPr>
+              <a:t> (</a:t>
+            </a:r>
+            <a:r>
+              <a:rPr lang="en-GB" sz="5000" i="1" dirty="0">
+                <a:solidFill>
+                  <a:srgbClr val="131E29"/>
+                </a:solidFill>
+                <a:latin typeface="Source Sans Pro" panose="020B0503030403020204" pitchFamily="34" charset="0"/>
+              </a:rPr>
+              <a:t>p</a:t>
+            </a:r>
+            <a:r>
+              <a:rPr lang="en-GB" sz="5000" dirty="0">
+                <a:solidFill>
+                  <a:srgbClr val="131E29"/>
+                </a:solidFill>
+                <a:latin typeface="Source Sans Pro" panose="020B0503030403020204" pitchFamily="34" charset="0"/>
+              </a:rPr>
+              <a:t> = .086, BF = 1.02) for an association between </a:t>
+            </a:r>
+            <a:r>
+              <a:rPr lang="en-GB" sz="5000" b="1" dirty="0">
+                <a:solidFill>
+                  <a:srgbClr val="131E29"/>
+                </a:solidFill>
+                <a:latin typeface="Source Sans Pro" panose="020B0503030403020204" pitchFamily="34" charset="0"/>
+              </a:rPr>
+              <a:t>total hours of playtime </a:t>
+            </a:r>
+            <a:r>
+              <a:rPr lang="en-GB" sz="5000" dirty="0">
+                <a:solidFill>
+                  <a:srgbClr val="131E29"/>
+                </a:solidFill>
+                <a:latin typeface="Source Sans Pro" panose="020B0503030403020204" pitchFamily="34" charset="0"/>
+              </a:rPr>
+              <a:t>and Learner/Non-Learner group status.</a:t>
+            </a:r>
+          </a:p>
+        </p:txBody>
+      </p:sp>
+      <p:grpSp>
+        <p:nvGrpSpPr>
+          <p:cNvPr id="75" name="Group 74">
+            <a:extLst>
+              <a:ext uri="{FF2B5EF4-FFF2-40B4-BE49-F238E27FC236}">
+                <a16:creationId xmlns:a16="http://schemas.microsoft.com/office/drawing/2014/main" id="{EB229131-718D-653C-D5A0-44561CE449BF}"/>
+              </a:ext>
+            </a:extLst>
+          </p:cNvPr>
+          <p:cNvGrpSpPr/>
+          <p:nvPr/>
+        </p:nvGrpSpPr>
+        <p:grpSpPr>
+          <a:xfrm>
+            <a:off x="22579619" y="15565767"/>
+            <a:ext cx="20317450" cy="5962725"/>
+            <a:chOff x="22778373" y="15705698"/>
+            <a:chExt cx="16553122" cy="4557650"/>
+          </a:xfrm>
+        </p:grpSpPr>
+        <p:grpSp>
+          <p:nvGrpSpPr>
+            <p:cNvPr id="74" name="Group 73">
+              <a:extLst>
+                <a:ext uri="{FF2B5EF4-FFF2-40B4-BE49-F238E27FC236}">
+                  <a16:creationId xmlns:a16="http://schemas.microsoft.com/office/drawing/2014/main" id="{BFE7E948-75AE-5084-DCAC-EDEB196CE05C}"/>
+                </a:ext>
+              </a:extLst>
+            </p:cNvPr>
+            <p:cNvGrpSpPr/>
+            <p:nvPr/>
+          </p:nvGrpSpPr>
+          <p:grpSpPr>
+            <a:xfrm>
+              <a:off x="22778373" y="15705698"/>
+              <a:ext cx="16553122" cy="4194745"/>
+              <a:chOff x="22778373" y="15705698"/>
+              <a:chExt cx="16553122" cy="4194745"/>
+            </a:xfrm>
+          </p:grpSpPr>
+          <p:pic>
+            <p:nvPicPr>
+              <p:cNvPr id="41" name="Picture 40" descr="A diagram of a function&#10;&#10;Description automatically generated with medium confidence">
+                <a:extLst>
+                  <a:ext uri="{FF2B5EF4-FFF2-40B4-BE49-F238E27FC236}">
+                    <a16:creationId xmlns:a16="http://schemas.microsoft.com/office/drawing/2014/main" id="{8B4E3C74-62BC-C8E1-368E-B89B19AC4E0F}"/>
+                  </a:ext>
+                </a:extLst>
+              </p:cNvPr>
+              <p:cNvPicPr>
+                <a:picLocks noChangeAspect="1"/>
+              </p:cNvPicPr>
+              <p:nvPr/>
+            </p:nvPicPr>
+            <p:blipFill rotWithShape="1">
+              <a:blip r:embed="rId24">
+                <a:extLst>
+                  <a:ext uri="{28A0092B-C50C-407E-A947-70E740481C1C}">
+                    <a14:useLocalDpi xmlns:a14="http://schemas.microsoft.com/office/drawing/2010/main" val="0"/>
+                  </a:ext>
+                </a:extLst>
+              </a:blip>
+              <a:srcRect l="3722" t="1380" r="64653" b="52402"/>
+              <a:stretch/>
+            </p:blipFill>
+            <p:spPr>
+              <a:xfrm>
+                <a:off x="23137563" y="15705698"/>
+                <a:ext cx="4018526" cy="4194744"/>
+              </a:xfrm>
+              <a:prstGeom prst="rect">
+                <a:avLst/>
+              </a:prstGeom>
+            </p:spPr>
+          </p:pic>
+          <p:pic>
+            <p:nvPicPr>
+              <p:cNvPr id="69" name="Picture 68" descr="A diagram of a function&#10;&#10;Description automatically generated with medium confidence">
+                <a:extLst>
+                  <a:ext uri="{FF2B5EF4-FFF2-40B4-BE49-F238E27FC236}">
+                    <a16:creationId xmlns:a16="http://schemas.microsoft.com/office/drawing/2014/main" id="{1F84C129-F982-7966-7F56-AFA934352108}"/>
+                  </a:ext>
+                </a:extLst>
+              </p:cNvPr>
+              <p:cNvPicPr>
+                <a:picLocks noChangeAspect="1"/>
+              </p:cNvPicPr>
+              <p:nvPr/>
+            </p:nvPicPr>
+            <p:blipFill rotWithShape="1">
+              <a:blip r:embed="rId24">
+                <a:extLst>
+                  <a:ext uri="{28A0092B-C50C-407E-A947-70E740481C1C}">
+                    <a14:useLocalDpi xmlns:a14="http://schemas.microsoft.com/office/drawing/2010/main" val="0"/>
+                  </a:ext>
+                </a:extLst>
+              </a:blip>
+              <a:srcRect l="2979" t="48724" b="4634"/>
+              <a:stretch/>
+            </p:blipFill>
+            <p:spPr>
+              <a:xfrm>
+                <a:off x="27115793" y="15705699"/>
+                <a:ext cx="12215702" cy="4194744"/>
               </a:xfrm>
               <a:prstGeom prst="rect">
                 <a:avLst/>
@@ -6201,69 +7809,10 @@
           </p:pic>
           <p:sp>
             <p:nvSpPr>
-              <p:cNvPr id="22" name="TextBox 30">
+              <p:cNvPr id="72" name="TextBox 71">
                 <a:extLst>
                   <a:ext uri="{FF2B5EF4-FFF2-40B4-BE49-F238E27FC236}">
-                    <a16:creationId xmlns:a16="http://schemas.microsoft.com/office/drawing/2014/main" id="{A8FDD62D-0F1E-4733-B233-510DE03D614F}"/>
-                  </a:ext>
-                </a:extLst>
-              </p:cNvPr>
-              <p:cNvSpPr txBox="1"/>
-              <p:nvPr/>
-            </p:nvSpPr>
-            <p:spPr>
-              <a:xfrm rot="16200000">
-                <a:off x="31356519" y="7839155"/>
-                <a:ext cx="7199998" cy="877163"/>
-              </a:xfrm>
-              <a:prstGeom prst="rect">
-                <a:avLst/>
-              </a:prstGeom>
-              <a:solidFill>
-                <a:schemeClr val="bg1"/>
-              </a:solidFill>
-              <a:ln cap="flat">
-                <a:noFill/>
-              </a:ln>
-            </p:spPr>
-            <p:txBody>
-              <a:bodyPr vert="horz" wrap="square" lIns="106680" tIns="53340" rIns="106680" bIns="53340" anchor="t" anchorCtr="0" compatLnSpc="1">
-                <a:spAutoFit/>
-              </a:bodyPr>
-              <a:lstStyle/>
-              <a:p>
-                <a:pPr algn="ctr" defTabSz="1066830">
-                  <a:defRPr sz="1800" b="0" i="0" u="none" strike="noStrike" kern="0" cap="none" spc="0" baseline="0">
-                    <a:solidFill>
-                      <a:srgbClr val="000000"/>
-                    </a:solidFill>
-                    <a:uFillTx/>
-                  </a:defRPr>
-                </a:pPr>
-                <a:r>
-                  <a:rPr lang="en-GB" sz="5000" b="1" kern="0" dirty="0">
-                    <a:solidFill>
-                      <a:srgbClr val="131E29"/>
-                    </a:solidFill>
-                    <a:latin typeface="Source Sans Pro" panose="020B0503030403020204" pitchFamily="34" charset="0"/>
-                  </a:rPr>
-                  <a:t>% Correct</a:t>
-                </a:r>
-                <a:endParaRPr lang="en-GB" sz="5000" b="1" dirty="0">
-                  <a:solidFill>
-                    <a:srgbClr val="131E29"/>
-                  </a:solidFill>
-                  <a:latin typeface="Source Sans Pro" panose="020B0503030403020204" pitchFamily="34" charset="0"/>
-                </a:endParaRPr>
-              </a:p>
-            </p:txBody>
-          </p:sp>
-          <p:sp>
-            <p:nvSpPr>
-              <p:cNvPr id="23" name="TextBox 30">
-                <a:extLst>
-                  <a:ext uri="{FF2B5EF4-FFF2-40B4-BE49-F238E27FC236}">
-                    <a16:creationId xmlns:a16="http://schemas.microsoft.com/office/drawing/2014/main" id="{3271F4A0-163F-3CC4-A990-EB30539EFAD4}"/>
+                    <a16:creationId xmlns:a16="http://schemas.microsoft.com/office/drawing/2014/main" id="{3DF6C1C1-94DC-9112-A82C-B071ADB4D4F4}"/>
                   </a:ext>
                 </a:extLst>
               </p:cNvPr>
@@ -6272,8 +7821,8 @@
             </p:nvSpPr>
             <p:spPr>
               <a:xfrm>
-                <a:off x="34517936" y="11877735"/>
-                <a:ext cx="8649202" cy="1044000"/>
+                <a:off x="22778373" y="15705698"/>
+                <a:ext cx="360000" cy="4194744"/>
               </a:xfrm>
               <a:prstGeom prst="rect">
                 <a:avLst/>
@@ -6281,276 +7830,24 @@
               <a:solidFill>
                 <a:schemeClr val="bg1"/>
               </a:solidFill>
-              <a:ln cap="flat">
-                <a:noFill/>
-              </a:ln>
             </p:spPr>
             <p:txBody>
-              <a:bodyPr vert="horz" wrap="square" lIns="106680" tIns="53340" rIns="106680" bIns="53340" anchor="t" anchorCtr="0" compatLnSpc="1">
+              <a:bodyPr wrap="square" rtlCol="0">
                 <a:spAutoFit/>
               </a:bodyPr>
               <a:lstStyle/>
               <a:p>
-                <a:pPr algn="ctr" defTabSz="1066830">
-                  <a:defRPr sz="1800" b="0" i="0" u="none" strike="noStrike" kern="0" cap="none" spc="0" baseline="0">
-                    <a:solidFill>
-                      <a:srgbClr val="000000"/>
-                    </a:solidFill>
-                    <a:uFillTx/>
-                  </a:defRPr>
-                </a:pPr>
-                <a:endParaRPr lang="en-GB" sz="5000" b="1" dirty="0">
-                  <a:solidFill>
-                    <a:srgbClr val="131E29"/>
-                  </a:solidFill>
-                  <a:latin typeface="Source Sans Pro" panose="020B0503030403020204" pitchFamily="34" charset="0"/>
-                </a:endParaRPr>
-              </a:p>
-            </p:txBody>
-          </p:sp>
-          <p:sp>
-            <p:nvSpPr>
-              <p:cNvPr id="24" name="TextBox 30">
-                <a:extLst>
-                  <a:ext uri="{FF2B5EF4-FFF2-40B4-BE49-F238E27FC236}">
-                    <a16:creationId xmlns:a16="http://schemas.microsoft.com/office/drawing/2014/main" id="{EF2C37C7-657A-D4AE-6E2F-FD6390B3A9C9}"/>
-                  </a:ext>
-                </a:extLst>
-              </p:cNvPr>
-              <p:cNvSpPr txBox="1"/>
-              <p:nvPr/>
-            </p:nvSpPr>
-            <p:spPr>
-              <a:xfrm>
-                <a:off x="36800094" y="11885420"/>
-                <a:ext cx="1420289" cy="1031051"/>
-              </a:xfrm>
-              <a:prstGeom prst="rect">
-                <a:avLst/>
-              </a:prstGeom>
-              <a:solidFill>
-                <a:schemeClr val="bg1"/>
-              </a:solidFill>
-              <a:ln cap="flat">
-                <a:noFill/>
-              </a:ln>
-            </p:spPr>
-            <p:txBody>
-              <a:bodyPr vert="horz" wrap="square" lIns="106680" tIns="53340" rIns="106680" bIns="53340" anchor="t" anchorCtr="0" compatLnSpc="1">
-                <a:spAutoFit/>
-              </a:bodyPr>
-              <a:lstStyle/>
-              <a:p>
-                <a:pPr algn="ctr" defTabSz="1066830">
-                  <a:defRPr sz="1800" b="0" i="0" u="none" strike="noStrike" kern="0" cap="none" spc="0" baseline="0">
-                    <a:solidFill>
-                      <a:srgbClr val="000000"/>
-                    </a:solidFill>
-                    <a:uFillTx/>
-                  </a:defRPr>
-                </a:pPr>
-                <a:r>
-                  <a:rPr lang="en-GB" sz="3000" kern="0" dirty="0">
-                    <a:solidFill>
-                      <a:srgbClr val="131E29"/>
-                    </a:solidFill>
-                    <a:latin typeface="Source Sans Pro" panose="020B0503030403020204" pitchFamily="34" charset="0"/>
-                  </a:rPr>
-                  <a:t>Block 1 Hebb</a:t>
-                </a:r>
-                <a:endParaRPr lang="en-GB" sz="3000" dirty="0">
-                  <a:solidFill>
-                    <a:srgbClr val="131E29"/>
-                  </a:solidFill>
-                  <a:latin typeface="Source Sans Pro" panose="020B0503030403020204" pitchFamily="34" charset="0"/>
-                </a:endParaRPr>
-              </a:p>
-            </p:txBody>
-          </p:sp>
-          <p:sp>
-            <p:nvSpPr>
-              <p:cNvPr id="25" name="TextBox 30">
-                <a:extLst>
-                  <a:ext uri="{FF2B5EF4-FFF2-40B4-BE49-F238E27FC236}">
-                    <a16:creationId xmlns:a16="http://schemas.microsoft.com/office/drawing/2014/main" id="{C5670AEA-4A5F-75A3-F174-BE6AD411E6FB}"/>
-                  </a:ext>
-                </a:extLst>
-              </p:cNvPr>
-              <p:cNvSpPr txBox="1"/>
-              <p:nvPr/>
-            </p:nvSpPr>
-            <p:spPr>
-              <a:xfrm>
-                <a:off x="38335620" y="11890684"/>
-                <a:ext cx="1420289" cy="1031051"/>
-              </a:xfrm>
-              <a:prstGeom prst="rect">
-                <a:avLst/>
-              </a:prstGeom>
-              <a:solidFill>
-                <a:schemeClr val="bg1"/>
-              </a:solidFill>
-              <a:ln cap="flat">
-                <a:noFill/>
-              </a:ln>
-            </p:spPr>
-            <p:txBody>
-              <a:bodyPr vert="horz" wrap="square" lIns="106680" tIns="53340" rIns="106680" bIns="53340" anchor="t" anchorCtr="0" compatLnSpc="1">
-                <a:spAutoFit/>
-              </a:bodyPr>
-              <a:lstStyle/>
-              <a:p>
-                <a:pPr algn="ctr" defTabSz="1066830">
-                  <a:defRPr sz="1800" b="0" i="0" u="none" strike="noStrike" kern="0" cap="none" spc="0" baseline="0">
-                    <a:solidFill>
-                      <a:srgbClr val="000000"/>
-                    </a:solidFill>
-                    <a:uFillTx/>
-                  </a:defRPr>
-                </a:pPr>
-                <a:r>
-                  <a:rPr lang="en-GB" sz="3000" kern="0" dirty="0">
-                    <a:solidFill>
-                      <a:srgbClr val="131E29"/>
-                    </a:solidFill>
-                    <a:latin typeface="Source Sans Pro" panose="020B0503030403020204" pitchFamily="34" charset="0"/>
-                  </a:rPr>
-                  <a:t>Block 2 Hebb</a:t>
-                </a:r>
-                <a:endParaRPr lang="en-GB" sz="3000" dirty="0">
-                  <a:solidFill>
-                    <a:srgbClr val="131E29"/>
-                  </a:solidFill>
-                  <a:latin typeface="Source Sans Pro" panose="020B0503030403020204" pitchFamily="34" charset="0"/>
-                </a:endParaRPr>
-              </a:p>
-            </p:txBody>
-          </p:sp>
-          <p:sp>
-            <p:nvSpPr>
-              <p:cNvPr id="26" name="TextBox 30">
-                <a:extLst>
-                  <a:ext uri="{FF2B5EF4-FFF2-40B4-BE49-F238E27FC236}">
-                    <a16:creationId xmlns:a16="http://schemas.microsoft.com/office/drawing/2014/main" id="{3FD5A4BA-3CF2-79EC-CF64-DD9CC0AE97EC}"/>
-                  </a:ext>
-                </a:extLst>
-              </p:cNvPr>
-              <p:cNvSpPr txBox="1"/>
-              <p:nvPr/>
-            </p:nvSpPr>
-            <p:spPr>
-              <a:xfrm>
-                <a:off x="39871146" y="11885420"/>
-                <a:ext cx="1420289" cy="1031051"/>
-              </a:xfrm>
-              <a:prstGeom prst="rect">
-                <a:avLst/>
-              </a:prstGeom>
-              <a:solidFill>
-                <a:schemeClr val="bg1"/>
-              </a:solidFill>
-              <a:ln cap="flat">
-                <a:noFill/>
-              </a:ln>
-            </p:spPr>
-            <p:txBody>
-              <a:bodyPr vert="horz" wrap="square" lIns="106680" tIns="53340" rIns="106680" bIns="53340" anchor="t" anchorCtr="0" compatLnSpc="1">
-                <a:spAutoFit/>
-              </a:bodyPr>
-              <a:lstStyle/>
-              <a:p>
-                <a:pPr algn="ctr" defTabSz="1066830">
-                  <a:defRPr sz="1800" b="0" i="0" u="none" strike="noStrike" kern="0" cap="none" spc="0" baseline="0">
-                    <a:solidFill>
-                      <a:srgbClr val="000000"/>
-                    </a:solidFill>
-                    <a:uFillTx/>
-                  </a:defRPr>
-                </a:pPr>
-                <a:r>
-                  <a:rPr lang="en-GB" sz="3000" kern="0" dirty="0">
-                    <a:solidFill>
-                      <a:srgbClr val="131E29"/>
-                    </a:solidFill>
-                    <a:latin typeface="Source Sans Pro" panose="020B0503030403020204" pitchFamily="34" charset="0"/>
-                  </a:rPr>
-                  <a:t>Block 1 Filler</a:t>
-                </a:r>
-                <a:endParaRPr lang="en-GB" sz="3000" dirty="0">
-                  <a:solidFill>
-                    <a:srgbClr val="131E29"/>
-                  </a:solidFill>
-                  <a:latin typeface="Source Sans Pro" panose="020B0503030403020204" pitchFamily="34" charset="0"/>
-                </a:endParaRPr>
-              </a:p>
-            </p:txBody>
-          </p:sp>
-          <p:sp>
-            <p:nvSpPr>
-              <p:cNvPr id="27" name="TextBox 30">
-                <a:extLst>
-                  <a:ext uri="{FF2B5EF4-FFF2-40B4-BE49-F238E27FC236}">
-                    <a16:creationId xmlns:a16="http://schemas.microsoft.com/office/drawing/2014/main" id="{82DFA8E7-7CFE-C7ED-6832-D2FC07E7C81E}"/>
-                  </a:ext>
-                </a:extLst>
-              </p:cNvPr>
-              <p:cNvSpPr txBox="1"/>
-              <p:nvPr/>
-            </p:nvSpPr>
-            <p:spPr>
-              <a:xfrm>
-                <a:off x="41406672" y="11890684"/>
-                <a:ext cx="1420289" cy="1031051"/>
-              </a:xfrm>
-              <a:prstGeom prst="rect">
-                <a:avLst/>
-              </a:prstGeom>
-              <a:solidFill>
-                <a:schemeClr val="bg1"/>
-              </a:solidFill>
-              <a:ln cap="flat">
-                <a:noFill/>
-              </a:ln>
-            </p:spPr>
-            <p:txBody>
-              <a:bodyPr vert="horz" wrap="square" lIns="106680" tIns="53340" rIns="106680" bIns="53340" anchor="t" anchorCtr="0" compatLnSpc="1">
-                <a:spAutoFit/>
-              </a:bodyPr>
-              <a:lstStyle/>
-              <a:p>
-                <a:pPr algn="ctr" defTabSz="1066830">
-                  <a:defRPr sz="1800" b="0" i="0" u="none" strike="noStrike" kern="0" cap="none" spc="0" baseline="0">
-                    <a:solidFill>
-                      <a:srgbClr val="000000"/>
-                    </a:solidFill>
-                    <a:uFillTx/>
-                  </a:defRPr>
-                </a:pPr>
-                <a:r>
-                  <a:rPr lang="en-GB" sz="3000" kern="0" dirty="0">
-                    <a:solidFill>
-                      <a:srgbClr val="131E29"/>
-                    </a:solidFill>
-                    <a:latin typeface="Source Sans Pro" panose="020B0503030403020204" pitchFamily="34" charset="0"/>
-                  </a:rPr>
-                  <a:t>Block 2 Filler</a:t>
-                </a:r>
-                <a:endParaRPr lang="en-GB" sz="3000" dirty="0">
-                  <a:solidFill>
-                    <a:srgbClr val="131E29"/>
-                  </a:solidFill>
-                  <a:latin typeface="Source Sans Pro" panose="020B0503030403020204" pitchFamily="34" charset="0"/>
-                </a:endParaRPr>
+                <a:endParaRPr lang="en-GB" dirty="0"/>
               </a:p>
             </p:txBody>
           </p:sp>
         </p:grpSp>
         <p:sp>
           <p:nvSpPr>
-            <p:cNvPr id="30" name="TextBox 30">
+            <p:cNvPr id="73" name="TextBox 72">
               <a:extLst>
                 <a:ext uri="{FF2B5EF4-FFF2-40B4-BE49-F238E27FC236}">
-                  <a16:creationId xmlns:a16="http://schemas.microsoft.com/office/drawing/2014/main" id="{93E09BC5-22FC-0CCE-7DA3-42B5E59200C9}"/>
+                  <a16:creationId xmlns:a16="http://schemas.microsoft.com/office/drawing/2014/main" id="{BEF4CA53-8B5B-DDB8-57C3-48B66E04C8BD}"/>
                 </a:ext>
               </a:extLst>
             </p:cNvPr>
@@ -6558,9 +7855,9 @@
             <p:nvPr/>
           </p:nvSpPr>
           <p:spPr>
-            <a:xfrm>
-              <a:off x="36658388" y="4695069"/>
-              <a:ext cx="6469746" cy="877163"/>
+            <a:xfrm rot="5400000">
+              <a:off x="30875095" y="11806948"/>
+              <a:ext cx="360000" cy="16552800"/>
             </a:xfrm>
             <a:prstGeom prst="rect">
               <a:avLst/>
@@ -6568,79 +7865,61 @@
             <a:solidFill>
               <a:schemeClr val="bg1"/>
             </a:solidFill>
-            <a:ln cap="flat">
-              <a:noFill/>
-            </a:ln>
           </p:spPr>
           <p:txBody>
-            <a:bodyPr vert="horz" wrap="square" lIns="106680" tIns="53340" rIns="106680" bIns="53340" anchor="t" anchorCtr="0" compatLnSpc="1">
+            <a:bodyPr wrap="square" rtlCol="0">
               <a:spAutoFit/>
             </a:bodyPr>
             <a:lstStyle/>
             <a:p>
-              <a:pPr algn="ctr" defTabSz="1066830">
-                <a:defRPr sz="1800" b="0" i="0" u="none" strike="noStrike" kern="0" cap="none" spc="0" baseline="0">
-                  <a:solidFill>
-                    <a:srgbClr val="000000"/>
-                  </a:solidFill>
-                  <a:uFillTx/>
-                </a:defRPr>
-              </a:pPr>
-              <a:r>
-                <a:rPr lang="en-GB" sz="5000" b="1" kern="0" dirty="0">
-                  <a:solidFill>
-                    <a:srgbClr val="131E29"/>
-                  </a:solidFill>
-                  <a:latin typeface="Source Sans Pro" panose="020B0503030403020204" pitchFamily="34" charset="0"/>
-                </a:rPr>
-                <a:t>Mean accuracy</a:t>
-              </a:r>
-              <a:endParaRPr lang="en-GB" sz="5000" b="1" dirty="0">
-                <a:solidFill>
-                  <a:srgbClr val="131E29"/>
-                </a:solidFill>
-                <a:latin typeface="Source Sans Pro" panose="020B0503030403020204" pitchFamily="34" charset="0"/>
-              </a:endParaRPr>
+              <a:endParaRPr lang="en-GB" dirty="0"/>
             </a:p>
           </p:txBody>
         </p:sp>
       </p:grpSp>
-      <p:pic>
-        <p:nvPicPr>
-          <p:cNvPr id="41" name="Picture 40" descr="A diagram of a function&#10;&#10;Description automatically generated with medium confidence">
+      <p:sp>
+        <p:nvSpPr>
+          <p:cNvPr id="77" name="TextBox 76">
             <a:extLst>
               <a:ext uri="{FF2B5EF4-FFF2-40B4-BE49-F238E27FC236}">
-                <a16:creationId xmlns:a16="http://schemas.microsoft.com/office/drawing/2014/main" id="{8B4E3C74-62BC-C8E1-368E-B89B19AC4E0F}"/>
+                <a16:creationId xmlns:a16="http://schemas.microsoft.com/office/drawing/2014/main" id="{3CE01F6F-936D-AEFD-775F-F7640BA7DF90}"/>
               </a:ext>
             </a:extLst>
           </p:cNvPr>
-          <p:cNvPicPr>
-            <a:picLocks noChangeAspect="1"/>
-          </p:cNvPicPr>
+          <p:cNvSpPr txBox="1"/>
           <p:nvPr/>
-        </p:nvPicPr>
-        <p:blipFill>
-          <a:blip r:embed="rId22">
-            <a:extLst>
-              <a:ext uri="{28A0092B-C50C-407E-A947-70E740481C1C}">
-                <a14:useLocalDpi xmlns:a14="http://schemas.microsoft.com/office/drawing/2010/main" val="0"/>
-              </a:ext>
-            </a:extLst>
-          </a:blip>
-          <a:stretch>
-            <a:fillRect/>
-          </a:stretch>
-        </p:blipFill>
+        </p:nvSpPr>
         <p:spPr>
           <a:xfrm>
-            <a:off x="22768020" y="13672167"/>
-            <a:ext cx="20042786" cy="14316275"/>
+            <a:off x="22325074" y="6678708"/>
+            <a:ext cx="11465047" cy="861774"/>
           </a:xfrm>
           <a:prstGeom prst="rect">
             <a:avLst/>
           </a:prstGeom>
+          <a:solidFill>
+            <a:srgbClr val="9ADBE8"/>
+          </a:solidFill>
         </p:spPr>
-      </p:pic>
+        <p:txBody>
+          <a:bodyPr wrap="square">
+            <a:spAutoFit/>
+          </a:bodyPr>
+          <a:lstStyle/>
+          <a:p>
+            <a:pPr algn="ctr"/>
+            <a:r>
+              <a:rPr lang="en-GB" sz="5000" b="1" dirty="0">
+                <a:solidFill>
+                  <a:srgbClr val="131E29"/>
+                </a:solidFill>
+                <a:latin typeface="Source Sans Pro" panose="020B0503030403020204" pitchFamily="34" charset="0"/>
+              </a:rPr>
+              <a:t>Bayesian Hierarchical Mixture Modelling</a:t>
+            </a:r>
+          </a:p>
+        </p:txBody>
+      </p:sp>
     </p:spTree>
     <p:extLst>
       <p:ext uri="{BB962C8B-B14F-4D97-AF65-F5344CB8AC3E}">

</xml_diff>